<commit_message>
-Add updated and completed all power point slides for each technology used in the MVP project discussing their tradeoffs and benefit for us -Move sensor_simulator program into docker so everything runs at once when building docker compose, no need to run it after anymore -Update README.md file to have proper markdowns
</commit_message>
<xml_diff>
--- a/Power Point Slides/First Principles Thinking PPT.pptx
+++ b/Power Point Slides/First Principles Thinking PPT.pptx
@@ -122,7 +122,7 @@
   </p:defaultTextStyle>
   <p:extLst>
     <p:ext uri="{EFAFB233-063F-42B5-8137-9DF3F51BA10A}">
-      <p15:sldGuideLst xmlns="" xmlns:p15="http://schemas.microsoft.com/office/powerpoint/2012/main">
+      <p15:sldGuideLst xmlns:p15="http://schemas.microsoft.com/office/powerpoint/2012/main" xmlns="">
         <p15:guide id="1" orient="horz" pos="2160">
           <p15:clr>
             <a:srgbClr val="A4A3A4"/>
@@ -136,7 +136,7 @@
       </p15:sldGuideLst>
     </p:ext>
     <p:ext uri="{2D200454-40CA-4A62-9FC3-DE9A4176ACB9}">
-      <p15:notesGuideLst xmlns="" xmlns:p15="http://schemas.microsoft.com/office/powerpoint/2012/main"/>
+      <p15:notesGuideLst xmlns:p15="http://schemas.microsoft.com/office/powerpoint/2012/main" xmlns=""/>
     </p:ext>
   </p:extLst>
 </p:presentation>
@@ -178,7 +178,7 @@
           <p:cNvPr id="2" name="Header Placeholder 1">
             <a:extLst>
               <a:ext uri="{FF2B5EF4-FFF2-40B4-BE49-F238E27FC236}">
-                <a16:creationId xmlns="" xmlns:a16="http://schemas.microsoft.com/office/drawing/2014/main" id="{273365B8-2511-D040-9EAC-EAD5E1AB0259}"/>
+                <a16:creationId xmlns:a16="http://schemas.microsoft.com/office/drawing/2014/main" xmlns="" id="{273365B8-2511-D040-9EAC-EAD5E1AB0259}"/>
               </a:ext>
             </a:extLst>
           </p:cNvPr>
@@ -215,7 +215,7 @@
           <p:cNvPr id="3" name="Date Placeholder 2">
             <a:extLst>
               <a:ext uri="{FF2B5EF4-FFF2-40B4-BE49-F238E27FC236}">
-                <a16:creationId xmlns="" xmlns:a16="http://schemas.microsoft.com/office/drawing/2014/main" id="{FA53D240-1E32-F546-97BB-3F81E4C94127}"/>
+                <a16:creationId xmlns:a16="http://schemas.microsoft.com/office/drawing/2014/main" xmlns="" id="{FA53D240-1E32-F546-97BB-3F81E4C94127}"/>
               </a:ext>
             </a:extLst>
           </p:cNvPr>
@@ -246,7 +246,7 @@
             <a:fld id="{5E46B522-554D-304C-B062-B3D14C953F88}" type="datetimeFigureOut">
               <a:rPr lang="en-US" smtClean="0"/>
               <a:pPr/>
-              <a:t>10/22/2024</a:t>
+              <a:t>10/31/2024</a:t>
             </a:fld>
             <a:endParaRPr lang="en-US"/>
           </a:p>
@@ -257,7 +257,7 @@
           <p:cNvPr id="4" name="Footer Placeholder 3">
             <a:extLst>
               <a:ext uri="{FF2B5EF4-FFF2-40B4-BE49-F238E27FC236}">
-                <a16:creationId xmlns="" xmlns:a16="http://schemas.microsoft.com/office/drawing/2014/main" id="{0FB1C412-F491-B74E-A609-73034009A4FE}"/>
+                <a16:creationId xmlns:a16="http://schemas.microsoft.com/office/drawing/2014/main" xmlns="" id="{0FB1C412-F491-B74E-A609-73034009A4FE}"/>
               </a:ext>
             </a:extLst>
           </p:cNvPr>
@@ -294,7 +294,7 @@
           <p:cNvPr id="5" name="Slide Number Placeholder 4">
             <a:extLst>
               <a:ext uri="{FF2B5EF4-FFF2-40B4-BE49-F238E27FC236}">
-                <a16:creationId xmlns="" xmlns:a16="http://schemas.microsoft.com/office/drawing/2014/main" id="{0B72CE36-DEB7-BF4C-A096-B6E5D881FA61}"/>
+                <a16:creationId xmlns:a16="http://schemas.microsoft.com/office/drawing/2014/main" xmlns="" id="{0B72CE36-DEB7-BF4C-A096-B6E5D881FA61}"/>
               </a:ext>
             </a:extLst>
           </p:cNvPr>
@@ -334,7 +334,7 @@
     </p:spTree>
     <p:extLst>
       <p:ext uri="{BB962C8B-B14F-4D97-AF65-F5344CB8AC3E}">
-        <p14:creationId xmlns="" xmlns:p14="http://schemas.microsoft.com/office/powerpoint/2010/main" val="2867797386"/>
+        <p14:creationId xmlns:p14="http://schemas.microsoft.com/office/powerpoint/2010/main" xmlns="" val="2867797386"/>
       </p:ext>
     </p:extLst>
   </p:cSld>
@@ -425,7 +425,7 @@
             <a:fld id="{5BA413F0-8702-4C58-A1DC-FE228FE832D3}" type="datetimeFigureOut">
               <a:rPr lang="en-US" smtClean="0"/>
               <a:pPr/>
-              <a:t>10/22/2024</a:t>
+              <a:t>10/31/2024</a:t>
             </a:fld>
             <a:endParaRPr lang="en-US"/>
           </a:p>
@@ -593,7 +593,7 @@
     </p:spTree>
     <p:extLst>
       <p:ext uri="{BB962C8B-B14F-4D97-AF65-F5344CB8AC3E}">
-        <p14:creationId xmlns="" xmlns:p14="http://schemas.microsoft.com/office/powerpoint/2010/main" val="2039652292"/>
+        <p14:creationId xmlns:p14="http://schemas.microsoft.com/office/powerpoint/2010/main" xmlns="" val="2039652292"/>
       </p:ext>
     </p:extLst>
   </p:cSld>
@@ -715,7 +715,7 @@
           <p:cNvPr id="8" name="Picture 7">
             <a:extLst>
               <a:ext uri="{FF2B5EF4-FFF2-40B4-BE49-F238E27FC236}">
-                <a16:creationId xmlns="" xmlns:a16="http://schemas.microsoft.com/office/drawing/2014/main" id="{DCB70024-7CB7-C54A-B281-8ABD3CB28A78}"/>
+                <a16:creationId xmlns:a16="http://schemas.microsoft.com/office/drawing/2014/main" xmlns="" id="{DCB70024-7CB7-C54A-B281-8ABD3CB28A78}"/>
               </a:ext>
             </a:extLst>
           </p:cNvPr>
@@ -745,7 +745,7 @@
           <p:cNvPr id="2" name="Title 1">
             <a:extLst>
               <a:ext uri="{FF2B5EF4-FFF2-40B4-BE49-F238E27FC236}">
-                <a16:creationId xmlns="" xmlns:a16="http://schemas.microsoft.com/office/drawing/2014/main" id="{31D28376-80FC-AA47-983D-5AA4ADF9D4A4}"/>
+                <a16:creationId xmlns:a16="http://schemas.microsoft.com/office/drawing/2014/main" xmlns="" id="{31D28376-80FC-AA47-983D-5AA4ADF9D4A4}"/>
               </a:ext>
             </a:extLst>
           </p:cNvPr>
@@ -788,7 +788,7 @@
           <p:cNvPr id="13" name="Text Placeholder 3">
             <a:extLst>
               <a:ext uri="{FF2B5EF4-FFF2-40B4-BE49-F238E27FC236}">
-                <a16:creationId xmlns="" xmlns:a16="http://schemas.microsoft.com/office/drawing/2014/main" id="{19FEBE34-6786-634C-97C1-F56667D4943E}"/>
+                <a16:creationId xmlns:a16="http://schemas.microsoft.com/office/drawing/2014/main" xmlns="" id="{19FEBE34-6786-634C-97C1-F56667D4943E}"/>
               </a:ext>
             </a:extLst>
           </p:cNvPr>
@@ -866,7 +866,7 @@
           <p:cNvPr id="14" name="Picture 13">
             <a:extLst>
               <a:ext uri="{FF2B5EF4-FFF2-40B4-BE49-F238E27FC236}">
-                <a16:creationId xmlns="" xmlns:a16="http://schemas.microsoft.com/office/drawing/2014/main" id="{FA18BCDF-85A9-7E46-B854-763E07701F49}"/>
+                <a16:creationId xmlns:a16="http://schemas.microsoft.com/office/drawing/2014/main" xmlns="" id="{FA18BCDF-85A9-7E46-B854-763E07701F49}"/>
               </a:ext>
             </a:extLst>
           </p:cNvPr>
@@ -894,7 +894,7 @@
     </p:spTree>
     <p:extLst>
       <p:ext uri="{BB962C8B-B14F-4D97-AF65-F5344CB8AC3E}">
-        <p14:creationId xmlns="" xmlns:p14="http://schemas.microsoft.com/office/powerpoint/2010/main" val="3242109002"/>
+        <p14:creationId xmlns:p14="http://schemas.microsoft.com/office/powerpoint/2010/main" xmlns="" val="3242109002"/>
       </p:ext>
     </p:extLst>
   </p:cSld>
@@ -902,7 +902,7 @@
     <a:masterClrMapping/>
   </p:clrMapOvr>
   <mc:AlternateContent xmlns:mc="http://schemas.openxmlformats.org/markup-compatibility/2006">
-    <mc:Choice xmlns="" xmlns:p14="http://schemas.microsoft.com/office/powerpoint/2010/main" Requires="p14">
+    <mc:Choice xmlns:p14="http://schemas.microsoft.com/office/powerpoint/2010/main" xmlns="" Requires="p14">
       <p:transition spd="slow" p14:dur="2000" advClick="0" advTm="5000"/>
     </mc:Choice>
     <mc:Fallback>
@@ -934,7 +934,7 @@
           <p:cNvPr id="3" name="Rectangle 2">
             <a:extLst>
               <a:ext uri="{FF2B5EF4-FFF2-40B4-BE49-F238E27FC236}">
-                <a16:creationId xmlns="" xmlns:a16="http://schemas.microsoft.com/office/drawing/2014/main" id="{312D6159-2173-3548-874C-452958A85DF6}"/>
+                <a16:creationId xmlns:a16="http://schemas.microsoft.com/office/drawing/2014/main" xmlns="" id="{312D6159-2173-3548-874C-452958A85DF6}"/>
               </a:ext>
             </a:extLst>
           </p:cNvPr>
@@ -994,7 +994,7 @@
           <p:cNvPr id="9" name="Picture 8">
             <a:extLst>
               <a:ext uri="{FF2B5EF4-FFF2-40B4-BE49-F238E27FC236}">
-                <a16:creationId xmlns="" xmlns:a16="http://schemas.microsoft.com/office/drawing/2014/main" id="{7D240A3C-FB87-A849-BF43-94582DC1113D}"/>
+                <a16:creationId xmlns:a16="http://schemas.microsoft.com/office/drawing/2014/main" xmlns="" id="{7D240A3C-FB87-A849-BF43-94582DC1113D}"/>
               </a:ext>
             </a:extLst>
           </p:cNvPr>
@@ -1024,7 +1024,7 @@
           <p:cNvPr id="5" name="Parallelogram 4">
             <a:extLst>
               <a:ext uri="{FF2B5EF4-FFF2-40B4-BE49-F238E27FC236}">
-                <a16:creationId xmlns="" xmlns:a16="http://schemas.microsoft.com/office/drawing/2014/main" id="{044CF2C6-1EB8-C545-A5EB-AF5DD2B28349}"/>
+                <a16:creationId xmlns:a16="http://schemas.microsoft.com/office/drawing/2014/main" xmlns="" id="{044CF2C6-1EB8-C545-A5EB-AF5DD2B28349}"/>
               </a:ext>
             </a:extLst>
           </p:cNvPr>
@@ -1080,7 +1080,7 @@
           <p:cNvPr id="11" name="Parallelogram 10">
             <a:extLst>
               <a:ext uri="{FF2B5EF4-FFF2-40B4-BE49-F238E27FC236}">
-                <a16:creationId xmlns="" xmlns:a16="http://schemas.microsoft.com/office/drawing/2014/main" id="{82DF6964-073F-A741-8B17-E0E690F4DF59}"/>
+                <a16:creationId xmlns:a16="http://schemas.microsoft.com/office/drawing/2014/main" xmlns="" id="{82DF6964-073F-A741-8B17-E0E690F4DF59}"/>
               </a:ext>
             </a:extLst>
           </p:cNvPr>
@@ -1136,7 +1136,7 @@
           <p:cNvPr id="12" name="Picture 11">
             <a:extLst>
               <a:ext uri="{FF2B5EF4-FFF2-40B4-BE49-F238E27FC236}">
-                <a16:creationId xmlns="" xmlns:a16="http://schemas.microsoft.com/office/drawing/2014/main" id="{5468F2ED-84BD-5740-B8E1-A6C010A50528}"/>
+                <a16:creationId xmlns:a16="http://schemas.microsoft.com/office/drawing/2014/main" xmlns="" id="{5468F2ED-84BD-5740-B8E1-A6C010A50528}"/>
               </a:ext>
             </a:extLst>
           </p:cNvPr>
@@ -1166,7 +1166,7 @@
           <p:cNvPr id="2" name="Title 1">
             <a:extLst>
               <a:ext uri="{FF2B5EF4-FFF2-40B4-BE49-F238E27FC236}">
-                <a16:creationId xmlns="" xmlns:a16="http://schemas.microsoft.com/office/drawing/2014/main" id="{31D28376-80FC-AA47-983D-5AA4ADF9D4A4}"/>
+                <a16:creationId xmlns:a16="http://schemas.microsoft.com/office/drawing/2014/main" xmlns="" id="{31D28376-80FC-AA47-983D-5AA4ADF9D4A4}"/>
               </a:ext>
             </a:extLst>
           </p:cNvPr>
@@ -1209,7 +1209,7 @@
           <p:cNvPr id="14" name="Picture 13">
             <a:extLst>
               <a:ext uri="{FF2B5EF4-FFF2-40B4-BE49-F238E27FC236}">
-                <a16:creationId xmlns="" xmlns:a16="http://schemas.microsoft.com/office/drawing/2014/main" id="{49AFA3BC-2111-0D40-8CDB-D02BC1839772}"/>
+                <a16:creationId xmlns:a16="http://schemas.microsoft.com/office/drawing/2014/main" xmlns="" id="{49AFA3BC-2111-0D40-8CDB-D02BC1839772}"/>
               </a:ext>
             </a:extLst>
           </p:cNvPr>
@@ -1239,7 +1239,7 @@
           <p:cNvPr id="10" name="Picture 9">
             <a:extLst>
               <a:ext uri="{FF2B5EF4-FFF2-40B4-BE49-F238E27FC236}">
-                <a16:creationId xmlns="" xmlns:a16="http://schemas.microsoft.com/office/drawing/2014/main" id="{3E633816-E054-8940-AF72-870913AF2214}"/>
+                <a16:creationId xmlns:a16="http://schemas.microsoft.com/office/drawing/2014/main" xmlns="" id="{3E633816-E054-8940-AF72-870913AF2214}"/>
               </a:ext>
             </a:extLst>
           </p:cNvPr>
@@ -1269,7 +1269,7 @@
           <p:cNvPr id="6" name="Parallelogram 5">
             <a:extLst>
               <a:ext uri="{FF2B5EF4-FFF2-40B4-BE49-F238E27FC236}">
-                <a16:creationId xmlns="" xmlns:a16="http://schemas.microsoft.com/office/drawing/2014/main" id="{8A924114-BABB-6746-9878-D1B4CE11052D}"/>
+                <a16:creationId xmlns:a16="http://schemas.microsoft.com/office/drawing/2014/main" xmlns="" id="{8A924114-BABB-6746-9878-D1B4CE11052D}"/>
               </a:ext>
             </a:extLst>
           </p:cNvPr>
@@ -1333,7 +1333,7 @@
           <p:cNvPr id="13" name="Text Placeholder 3">
             <a:extLst>
               <a:ext uri="{FF2B5EF4-FFF2-40B4-BE49-F238E27FC236}">
-                <a16:creationId xmlns="" xmlns:a16="http://schemas.microsoft.com/office/drawing/2014/main" id="{19FEBE34-6786-634C-97C1-F56667D4943E}"/>
+                <a16:creationId xmlns:a16="http://schemas.microsoft.com/office/drawing/2014/main" xmlns="" id="{19FEBE34-6786-634C-97C1-F56667D4943E}"/>
               </a:ext>
             </a:extLst>
           </p:cNvPr>
@@ -1409,7 +1409,7 @@
     </p:spTree>
     <p:extLst>
       <p:ext uri="{BB962C8B-B14F-4D97-AF65-F5344CB8AC3E}">
-        <p14:creationId xmlns="" xmlns:p14="http://schemas.microsoft.com/office/powerpoint/2010/main" val="1934555395"/>
+        <p14:creationId xmlns:p14="http://schemas.microsoft.com/office/powerpoint/2010/main" xmlns="" val="1934555395"/>
       </p:ext>
     </p:extLst>
   </p:cSld>
@@ -1417,7 +1417,7 @@
     <a:masterClrMapping/>
   </p:clrMapOvr>
   <mc:AlternateContent xmlns:mc="http://schemas.openxmlformats.org/markup-compatibility/2006">
-    <mc:Choice xmlns="" xmlns:p14="http://schemas.microsoft.com/office/powerpoint/2010/main" Requires="p14">
+    <mc:Choice xmlns:p14="http://schemas.microsoft.com/office/powerpoint/2010/main" xmlns="" Requires="p14">
       <p:transition spd="slow" p14:dur="2000" advClick="0" advTm="5000"/>
     </mc:Choice>
     <mc:Fallback>
@@ -1449,7 +1449,7 @@
           <p:cNvPr id="7" name="Picture 6">
             <a:extLst>
               <a:ext uri="{FF2B5EF4-FFF2-40B4-BE49-F238E27FC236}">
-                <a16:creationId xmlns="" xmlns:a16="http://schemas.microsoft.com/office/drawing/2014/main" id="{BCA450C1-58BE-6E4E-9CBF-0FB691FD755E}"/>
+                <a16:creationId xmlns:a16="http://schemas.microsoft.com/office/drawing/2014/main" xmlns="" id="{BCA450C1-58BE-6E4E-9CBF-0FB691FD755E}"/>
               </a:ext>
             </a:extLst>
           </p:cNvPr>
@@ -1479,7 +1479,7 @@
           <p:cNvPr id="14" name="Picture 13">
             <a:extLst>
               <a:ext uri="{FF2B5EF4-FFF2-40B4-BE49-F238E27FC236}">
-                <a16:creationId xmlns="" xmlns:a16="http://schemas.microsoft.com/office/drawing/2014/main" id="{0CFBEA58-BD22-D24F-B512-8BA514AB9008}"/>
+                <a16:creationId xmlns:a16="http://schemas.microsoft.com/office/drawing/2014/main" xmlns="" id="{0CFBEA58-BD22-D24F-B512-8BA514AB9008}"/>
               </a:ext>
             </a:extLst>
           </p:cNvPr>
@@ -1509,7 +1509,7 @@
           <p:cNvPr id="2" name="Title 1">
             <a:extLst>
               <a:ext uri="{FF2B5EF4-FFF2-40B4-BE49-F238E27FC236}">
-                <a16:creationId xmlns="" xmlns:a16="http://schemas.microsoft.com/office/drawing/2014/main" id="{31D28376-80FC-AA47-983D-5AA4ADF9D4A4}"/>
+                <a16:creationId xmlns:a16="http://schemas.microsoft.com/office/drawing/2014/main" xmlns="" id="{31D28376-80FC-AA47-983D-5AA4ADF9D4A4}"/>
               </a:ext>
             </a:extLst>
           </p:cNvPr>
@@ -1550,7 +1550,7 @@
           <p:cNvPr id="13" name="Text Placeholder 3">
             <a:extLst>
               <a:ext uri="{FF2B5EF4-FFF2-40B4-BE49-F238E27FC236}">
-                <a16:creationId xmlns="" xmlns:a16="http://schemas.microsoft.com/office/drawing/2014/main" id="{19FEBE34-6786-634C-97C1-F56667D4943E}"/>
+                <a16:creationId xmlns:a16="http://schemas.microsoft.com/office/drawing/2014/main" xmlns="" id="{19FEBE34-6786-634C-97C1-F56667D4943E}"/>
               </a:ext>
             </a:extLst>
           </p:cNvPr>
@@ -1628,7 +1628,7 @@
     </p:spTree>
     <p:extLst>
       <p:ext uri="{BB962C8B-B14F-4D97-AF65-F5344CB8AC3E}">
-        <p14:creationId xmlns="" xmlns:p14="http://schemas.microsoft.com/office/powerpoint/2010/main" val="3633923498"/>
+        <p14:creationId xmlns:p14="http://schemas.microsoft.com/office/powerpoint/2010/main" xmlns="" val="3633923498"/>
       </p:ext>
     </p:extLst>
   </p:cSld>
@@ -1636,7 +1636,7 @@
     <a:masterClrMapping/>
   </p:clrMapOvr>
   <mc:AlternateContent xmlns:mc="http://schemas.openxmlformats.org/markup-compatibility/2006">
-    <mc:Choice xmlns="" xmlns:p14="http://schemas.microsoft.com/office/powerpoint/2010/main" Requires="p14">
+    <mc:Choice xmlns:p14="http://schemas.microsoft.com/office/powerpoint/2010/main" xmlns="" Requires="p14">
       <p:transition spd="slow" p14:dur="2000" advClick="0" advTm="5000"/>
     </mc:Choice>
     <mc:Fallback>
@@ -1668,7 +1668,7 @@
           <p:cNvPr id="4" name="Picture 3">
             <a:extLst>
               <a:ext uri="{FF2B5EF4-FFF2-40B4-BE49-F238E27FC236}">
-                <a16:creationId xmlns="" xmlns:a16="http://schemas.microsoft.com/office/drawing/2014/main" id="{7216A11E-EB76-6A4D-AE29-9332E8815DF5}"/>
+                <a16:creationId xmlns:a16="http://schemas.microsoft.com/office/drawing/2014/main" xmlns="" id="{7216A11E-EB76-6A4D-AE29-9332E8815DF5}"/>
               </a:ext>
             </a:extLst>
           </p:cNvPr>
@@ -1698,7 +1698,7 @@
           <p:cNvPr id="14" name="Picture 13">
             <a:extLst>
               <a:ext uri="{FF2B5EF4-FFF2-40B4-BE49-F238E27FC236}">
-                <a16:creationId xmlns="" xmlns:a16="http://schemas.microsoft.com/office/drawing/2014/main" id="{05601A25-21DD-1E4D-AFB7-71CAFF449160}"/>
+                <a16:creationId xmlns:a16="http://schemas.microsoft.com/office/drawing/2014/main" xmlns="" id="{05601A25-21DD-1E4D-AFB7-71CAFF449160}"/>
               </a:ext>
             </a:extLst>
           </p:cNvPr>
@@ -1728,7 +1728,7 @@
           <p:cNvPr id="5" name="Slide Number Placeholder 4">
             <a:extLst>
               <a:ext uri="{FF2B5EF4-FFF2-40B4-BE49-F238E27FC236}">
-                <a16:creationId xmlns="" xmlns:a16="http://schemas.microsoft.com/office/drawing/2014/main" id="{E766DCC1-03BD-8D48-975F-E848D408E17A}"/>
+                <a16:creationId xmlns:a16="http://schemas.microsoft.com/office/drawing/2014/main" xmlns="" id="{E766DCC1-03BD-8D48-975F-E848D408E17A}"/>
               </a:ext>
             </a:extLst>
           </p:cNvPr>
@@ -1771,7 +1771,7 @@
           <p:cNvPr id="13" name="Picture 12">
             <a:extLst>
               <a:ext uri="{FF2B5EF4-FFF2-40B4-BE49-F238E27FC236}">
-                <a16:creationId xmlns="" xmlns:a16="http://schemas.microsoft.com/office/drawing/2014/main" id="{0FC8616F-1480-6F40-B21A-CC2BA2C45BED}"/>
+                <a16:creationId xmlns:a16="http://schemas.microsoft.com/office/drawing/2014/main" xmlns="" id="{0FC8616F-1480-6F40-B21A-CC2BA2C45BED}"/>
               </a:ext>
             </a:extLst>
           </p:cNvPr>
@@ -1801,7 +1801,7 @@
           <p:cNvPr id="8" name="Text Placeholder 3">
             <a:extLst>
               <a:ext uri="{FF2B5EF4-FFF2-40B4-BE49-F238E27FC236}">
-                <a16:creationId xmlns="" xmlns:a16="http://schemas.microsoft.com/office/drawing/2014/main" id="{28EA1C4D-6527-1A41-B80D-82366B12758F}"/>
+                <a16:creationId xmlns:a16="http://schemas.microsoft.com/office/drawing/2014/main" xmlns="" id="{28EA1C4D-6527-1A41-B80D-82366B12758F}"/>
               </a:ext>
             </a:extLst>
           </p:cNvPr>
@@ -1894,7 +1894,7 @@
           <p:cNvPr id="9" name="Text Placeholder 3">
             <a:extLst>
               <a:ext uri="{FF2B5EF4-FFF2-40B4-BE49-F238E27FC236}">
-                <a16:creationId xmlns="" xmlns:a16="http://schemas.microsoft.com/office/drawing/2014/main" id="{C9953FA3-FF52-2645-8039-6B173888D710}"/>
+                <a16:creationId xmlns:a16="http://schemas.microsoft.com/office/drawing/2014/main" xmlns="" id="{C9953FA3-FF52-2645-8039-6B173888D710}"/>
               </a:ext>
             </a:extLst>
           </p:cNvPr>
@@ -1976,7 +1976,7 @@
           <p:cNvPr id="10" name="Title 1">
             <a:extLst>
               <a:ext uri="{FF2B5EF4-FFF2-40B4-BE49-F238E27FC236}">
-                <a16:creationId xmlns="" xmlns:a16="http://schemas.microsoft.com/office/drawing/2014/main" id="{4AE68015-0AAC-0C46-8F76-36477CC385DE}"/>
+                <a16:creationId xmlns:a16="http://schemas.microsoft.com/office/drawing/2014/main" xmlns="" id="{4AE68015-0AAC-0C46-8F76-36477CC385DE}"/>
               </a:ext>
             </a:extLst>
           </p:cNvPr>
@@ -2019,7 +2019,7 @@
           <p:cNvPr id="11" name="Text Placeholder 3">
             <a:extLst>
               <a:ext uri="{FF2B5EF4-FFF2-40B4-BE49-F238E27FC236}">
-                <a16:creationId xmlns="" xmlns:a16="http://schemas.microsoft.com/office/drawing/2014/main" id="{169BBA5D-EECF-4043-90D1-DD6BB50A5390}"/>
+                <a16:creationId xmlns:a16="http://schemas.microsoft.com/office/drawing/2014/main" xmlns="" id="{169BBA5D-EECF-4043-90D1-DD6BB50A5390}"/>
               </a:ext>
             </a:extLst>
           </p:cNvPr>
@@ -2096,7 +2096,7 @@
     </p:spTree>
     <p:extLst>
       <p:ext uri="{BB962C8B-B14F-4D97-AF65-F5344CB8AC3E}">
-        <p14:creationId xmlns="" xmlns:p14="http://schemas.microsoft.com/office/powerpoint/2010/main" val="3416040107"/>
+        <p14:creationId xmlns:p14="http://schemas.microsoft.com/office/powerpoint/2010/main" xmlns="" val="3416040107"/>
       </p:ext>
     </p:extLst>
   </p:cSld>
@@ -2104,7 +2104,7 @@
     <a:masterClrMapping/>
   </p:clrMapOvr>
   <mc:AlternateContent xmlns:mc="http://schemas.openxmlformats.org/markup-compatibility/2006">
-    <mc:Choice xmlns="" xmlns:p14="http://schemas.microsoft.com/office/powerpoint/2010/main" Requires="p14">
+    <mc:Choice xmlns:p14="http://schemas.microsoft.com/office/powerpoint/2010/main" xmlns="" Requires="p14">
       <p:transition spd="slow" p14:dur="2000" advClick="0" advTm="5000"/>
     </mc:Choice>
     <mc:Fallback>
@@ -2136,7 +2136,7 @@
           <p:cNvPr id="7" name="Picture 6">
             <a:extLst>
               <a:ext uri="{FF2B5EF4-FFF2-40B4-BE49-F238E27FC236}">
-                <a16:creationId xmlns="" xmlns:a16="http://schemas.microsoft.com/office/drawing/2014/main" id="{A4D44DAB-CF6D-0148-B76F-DB4FDFF7BE3C}"/>
+                <a16:creationId xmlns:a16="http://schemas.microsoft.com/office/drawing/2014/main" xmlns="" id="{A4D44DAB-CF6D-0148-B76F-DB4FDFF7BE3C}"/>
               </a:ext>
             </a:extLst>
           </p:cNvPr>
@@ -2166,7 +2166,7 @@
           <p:cNvPr id="14" name="Picture 13">
             <a:extLst>
               <a:ext uri="{FF2B5EF4-FFF2-40B4-BE49-F238E27FC236}">
-                <a16:creationId xmlns="" xmlns:a16="http://schemas.microsoft.com/office/drawing/2014/main" id="{05601A25-21DD-1E4D-AFB7-71CAFF449160}"/>
+                <a16:creationId xmlns:a16="http://schemas.microsoft.com/office/drawing/2014/main" xmlns="" id="{05601A25-21DD-1E4D-AFB7-71CAFF449160}"/>
               </a:ext>
             </a:extLst>
           </p:cNvPr>
@@ -2196,7 +2196,7 @@
           <p:cNvPr id="5" name="Slide Number Placeholder 4">
             <a:extLst>
               <a:ext uri="{FF2B5EF4-FFF2-40B4-BE49-F238E27FC236}">
-                <a16:creationId xmlns="" xmlns:a16="http://schemas.microsoft.com/office/drawing/2014/main" id="{E766DCC1-03BD-8D48-975F-E848D408E17A}"/>
+                <a16:creationId xmlns:a16="http://schemas.microsoft.com/office/drawing/2014/main" xmlns="" id="{E766DCC1-03BD-8D48-975F-E848D408E17A}"/>
               </a:ext>
             </a:extLst>
           </p:cNvPr>
@@ -2239,7 +2239,7 @@
           <p:cNvPr id="13" name="Picture 12">
             <a:extLst>
               <a:ext uri="{FF2B5EF4-FFF2-40B4-BE49-F238E27FC236}">
-                <a16:creationId xmlns="" xmlns:a16="http://schemas.microsoft.com/office/drawing/2014/main" id="{0FC8616F-1480-6F40-B21A-CC2BA2C45BED}"/>
+                <a16:creationId xmlns:a16="http://schemas.microsoft.com/office/drawing/2014/main" xmlns="" id="{0FC8616F-1480-6F40-B21A-CC2BA2C45BED}"/>
               </a:ext>
             </a:extLst>
           </p:cNvPr>
@@ -2269,7 +2269,7 @@
           <p:cNvPr id="8" name="Text Placeholder 3">
             <a:extLst>
               <a:ext uri="{FF2B5EF4-FFF2-40B4-BE49-F238E27FC236}">
-                <a16:creationId xmlns="" xmlns:a16="http://schemas.microsoft.com/office/drawing/2014/main" id="{28EA1C4D-6527-1A41-B80D-82366B12758F}"/>
+                <a16:creationId xmlns:a16="http://schemas.microsoft.com/office/drawing/2014/main" xmlns="" id="{28EA1C4D-6527-1A41-B80D-82366B12758F}"/>
               </a:ext>
             </a:extLst>
           </p:cNvPr>
@@ -2362,7 +2362,7 @@
           <p:cNvPr id="10" name="Title 1">
             <a:extLst>
               <a:ext uri="{FF2B5EF4-FFF2-40B4-BE49-F238E27FC236}">
-                <a16:creationId xmlns="" xmlns:a16="http://schemas.microsoft.com/office/drawing/2014/main" id="{4AE68015-0AAC-0C46-8F76-36477CC385DE}"/>
+                <a16:creationId xmlns:a16="http://schemas.microsoft.com/office/drawing/2014/main" xmlns="" id="{4AE68015-0AAC-0C46-8F76-36477CC385DE}"/>
               </a:ext>
             </a:extLst>
           </p:cNvPr>
@@ -2405,7 +2405,7 @@
           <p:cNvPr id="11" name="Text Placeholder 3">
             <a:extLst>
               <a:ext uri="{FF2B5EF4-FFF2-40B4-BE49-F238E27FC236}">
-                <a16:creationId xmlns="" xmlns:a16="http://schemas.microsoft.com/office/drawing/2014/main" id="{169BBA5D-EECF-4043-90D1-DD6BB50A5390}"/>
+                <a16:creationId xmlns:a16="http://schemas.microsoft.com/office/drawing/2014/main" xmlns="" id="{169BBA5D-EECF-4043-90D1-DD6BB50A5390}"/>
               </a:ext>
             </a:extLst>
           </p:cNvPr>
@@ -2482,7 +2482,7 @@
     </p:spTree>
     <p:extLst>
       <p:ext uri="{BB962C8B-B14F-4D97-AF65-F5344CB8AC3E}">
-        <p14:creationId xmlns="" xmlns:p14="http://schemas.microsoft.com/office/powerpoint/2010/main" val="42572479"/>
+        <p14:creationId xmlns:p14="http://schemas.microsoft.com/office/powerpoint/2010/main" xmlns="" val="42572479"/>
       </p:ext>
     </p:extLst>
   </p:cSld>
@@ -2490,7 +2490,7 @@
     <a:masterClrMapping/>
   </p:clrMapOvr>
   <mc:AlternateContent xmlns:mc="http://schemas.openxmlformats.org/markup-compatibility/2006">
-    <mc:Choice xmlns="" xmlns:p14="http://schemas.microsoft.com/office/powerpoint/2010/main" Requires="p14">
+    <mc:Choice xmlns:p14="http://schemas.microsoft.com/office/powerpoint/2010/main" xmlns="" Requires="p14">
       <p:transition spd="slow" p14:dur="2000" advClick="0" advTm="5000"/>
     </mc:Choice>
     <mc:Fallback>
@@ -2522,7 +2522,7 @@
           <p:cNvPr id="14" name="Picture 13">
             <a:extLst>
               <a:ext uri="{FF2B5EF4-FFF2-40B4-BE49-F238E27FC236}">
-                <a16:creationId xmlns="" xmlns:a16="http://schemas.microsoft.com/office/drawing/2014/main" id="{C7A97301-F55A-4C46-8CF8-5B32F4872318}"/>
+                <a16:creationId xmlns:a16="http://schemas.microsoft.com/office/drawing/2014/main" xmlns="" id="{C7A97301-F55A-4C46-8CF8-5B32F4872318}"/>
               </a:ext>
             </a:extLst>
           </p:cNvPr>
@@ -2552,7 +2552,7 @@
           <p:cNvPr id="5" name="Slide Number Placeholder 4">
             <a:extLst>
               <a:ext uri="{FF2B5EF4-FFF2-40B4-BE49-F238E27FC236}">
-                <a16:creationId xmlns="" xmlns:a16="http://schemas.microsoft.com/office/drawing/2014/main" id="{E766DCC1-03BD-8D48-975F-E848D408E17A}"/>
+                <a16:creationId xmlns:a16="http://schemas.microsoft.com/office/drawing/2014/main" xmlns="" id="{E766DCC1-03BD-8D48-975F-E848D408E17A}"/>
               </a:ext>
             </a:extLst>
           </p:cNvPr>
@@ -2595,7 +2595,7 @@
           <p:cNvPr id="13" name="Picture 12">
             <a:extLst>
               <a:ext uri="{FF2B5EF4-FFF2-40B4-BE49-F238E27FC236}">
-                <a16:creationId xmlns="" xmlns:a16="http://schemas.microsoft.com/office/drawing/2014/main" id="{0FC8616F-1480-6F40-B21A-CC2BA2C45BED}"/>
+                <a16:creationId xmlns:a16="http://schemas.microsoft.com/office/drawing/2014/main" xmlns="" id="{0FC8616F-1480-6F40-B21A-CC2BA2C45BED}"/>
               </a:ext>
             </a:extLst>
           </p:cNvPr>
@@ -2625,7 +2625,7 @@
           <p:cNvPr id="8" name="Text Placeholder 3">
             <a:extLst>
               <a:ext uri="{FF2B5EF4-FFF2-40B4-BE49-F238E27FC236}">
-                <a16:creationId xmlns="" xmlns:a16="http://schemas.microsoft.com/office/drawing/2014/main" id="{28EA1C4D-6527-1A41-B80D-82366B12758F}"/>
+                <a16:creationId xmlns:a16="http://schemas.microsoft.com/office/drawing/2014/main" xmlns="" id="{28EA1C4D-6527-1A41-B80D-82366B12758F}"/>
               </a:ext>
             </a:extLst>
           </p:cNvPr>
@@ -2718,7 +2718,7 @@
           <p:cNvPr id="9" name="Text Placeholder 3">
             <a:extLst>
               <a:ext uri="{FF2B5EF4-FFF2-40B4-BE49-F238E27FC236}">
-                <a16:creationId xmlns="" xmlns:a16="http://schemas.microsoft.com/office/drawing/2014/main" id="{C9953FA3-FF52-2645-8039-6B173888D710}"/>
+                <a16:creationId xmlns:a16="http://schemas.microsoft.com/office/drawing/2014/main" xmlns="" id="{C9953FA3-FF52-2645-8039-6B173888D710}"/>
               </a:ext>
             </a:extLst>
           </p:cNvPr>
@@ -2800,7 +2800,7 @@
           <p:cNvPr id="10" name="Title 1">
             <a:extLst>
               <a:ext uri="{FF2B5EF4-FFF2-40B4-BE49-F238E27FC236}">
-                <a16:creationId xmlns="" xmlns:a16="http://schemas.microsoft.com/office/drawing/2014/main" id="{4AE68015-0AAC-0C46-8F76-36477CC385DE}"/>
+                <a16:creationId xmlns:a16="http://schemas.microsoft.com/office/drawing/2014/main" xmlns="" id="{4AE68015-0AAC-0C46-8F76-36477CC385DE}"/>
               </a:ext>
             </a:extLst>
           </p:cNvPr>
@@ -2843,7 +2843,7 @@
           <p:cNvPr id="11" name="Text Placeholder 3">
             <a:extLst>
               <a:ext uri="{FF2B5EF4-FFF2-40B4-BE49-F238E27FC236}">
-                <a16:creationId xmlns="" xmlns:a16="http://schemas.microsoft.com/office/drawing/2014/main" id="{169BBA5D-EECF-4043-90D1-DD6BB50A5390}"/>
+                <a16:creationId xmlns:a16="http://schemas.microsoft.com/office/drawing/2014/main" xmlns="" id="{169BBA5D-EECF-4043-90D1-DD6BB50A5390}"/>
               </a:ext>
             </a:extLst>
           </p:cNvPr>
@@ -2920,7 +2920,7 @@
     </p:spTree>
     <p:extLst>
       <p:ext uri="{BB962C8B-B14F-4D97-AF65-F5344CB8AC3E}">
-        <p14:creationId xmlns="" xmlns:p14="http://schemas.microsoft.com/office/powerpoint/2010/main" val="2804536604"/>
+        <p14:creationId xmlns:p14="http://schemas.microsoft.com/office/powerpoint/2010/main" xmlns="" val="2804536604"/>
       </p:ext>
     </p:extLst>
   </p:cSld>
@@ -2928,7 +2928,7 @@
     <a:masterClrMapping/>
   </p:clrMapOvr>
   <mc:AlternateContent xmlns:mc="http://schemas.openxmlformats.org/markup-compatibility/2006">
-    <mc:Choice xmlns="" xmlns:p14="http://schemas.microsoft.com/office/powerpoint/2010/main" Requires="p14">
+    <mc:Choice xmlns:p14="http://schemas.microsoft.com/office/powerpoint/2010/main" xmlns="" Requires="p14">
       <p:transition spd="slow" p14:dur="2000" advClick="0" advTm="5000"/>
     </mc:Choice>
     <mc:Fallback>
@@ -2960,7 +2960,7 @@
           <p:cNvPr id="4" name="Picture 3">
             <a:extLst>
               <a:ext uri="{FF2B5EF4-FFF2-40B4-BE49-F238E27FC236}">
-                <a16:creationId xmlns="" xmlns:a16="http://schemas.microsoft.com/office/drawing/2014/main" id="{62DB0137-4B83-6740-9717-4074AFAED09F}"/>
+                <a16:creationId xmlns:a16="http://schemas.microsoft.com/office/drawing/2014/main" xmlns="" id="{62DB0137-4B83-6740-9717-4074AFAED09F}"/>
               </a:ext>
             </a:extLst>
           </p:cNvPr>
@@ -2990,7 +2990,7 @@
           <p:cNvPr id="12" name="Slide Number Placeholder 4">
             <a:extLst>
               <a:ext uri="{FF2B5EF4-FFF2-40B4-BE49-F238E27FC236}">
-                <a16:creationId xmlns="" xmlns:a16="http://schemas.microsoft.com/office/drawing/2014/main" id="{A2C3A02E-F82F-EB4D-AA11-F0AB465E4529}"/>
+                <a16:creationId xmlns:a16="http://schemas.microsoft.com/office/drawing/2014/main" xmlns="" id="{A2C3A02E-F82F-EB4D-AA11-F0AB465E4529}"/>
               </a:ext>
             </a:extLst>
           </p:cNvPr>
@@ -3033,7 +3033,7 @@
           <p:cNvPr id="9" name="Picture 8">
             <a:extLst>
               <a:ext uri="{FF2B5EF4-FFF2-40B4-BE49-F238E27FC236}">
-                <a16:creationId xmlns="" xmlns:a16="http://schemas.microsoft.com/office/drawing/2014/main" id="{59D77EAE-7535-D344-A09B-3EC1D6BA9399}"/>
+                <a16:creationId xmlns:a16="http://schemas.microsoft.com/office/drawing/2014/main" xmlns="" id="{59D77EAE-7535-D344-A09B-3EC1D6BA9399}"/>
               </a:ext>
             </a:extLst>
           </p:cNvPr>
@@ -3063,7 +3063,7 @@
           <p:cNvPr id="13" name="Title 1">
             <a:extLst>
               <a:ext uri="{FF2B5EF4-FFF2-40B4-BE49-F238E27FC236}">
-                <a16:creationId xmlns="" xmlns:a16="http://schemas.microsoft.com/office/drawing/2014/main" id="{2258039E-D7E6-874C-986C-F6066D55B1D5}"/>
+                <a16:creationId xmlns:a16="http://schemas.microsoft.com/office/drawing/2014/main" xmlns="" id="{2258039E-D7E6-874C-986C-F6066D55B1D5}"/>
               </a:ext>
             </a:extLst>
           </p:cNvPr>
@@ -3104,7 +3104,7 @@
     </p:spTree>
     <p:extLst>
       <p:ext uri="{BB962C8B-B14F-4D97-AF65-F5344CB8AC3E}">
-        <p14:creationId xmlns="" xmlns:p14="http://schemas.microsoft.com/office/powerpoint/2010/main" val="600747958"/>
+        <p14:creationId xmlns:p14="http://schemas.microsoft.com/office/powerpoint/2010/main" xmlns="" val="600747958"/>
       </p:ext>
     </p:extLst>
   </p:cSld>
@@ -3112,7 +3112,7 @@
     <a:masterClrMapping/>
   </p:clrMapOvr>
   <mc:AlternateContent xmlns:mc="http://schemas.openxmlformats.org/markup-compatibility/2006">
-    <mc:Choice xmlns="" xmlns:p14="http://schemas.microsoft.com/office/powerpoint/2010/main" Requires="p14">
+    <mc:Choice xmlns:p14="http://schemas.microsoft.com/office/powerpoint/2010/main" xmlns="" Requires="p14">
       <p:transition spd="slow" p14:dur="2000" advClick="0" advTm="5000"/>
     </mc:Choice>
     <mc:Fallback>
@@ -3144,7 +3144,7 @@
           <p:cNvPr id="4" name="Picture 3">
             <a:extLst>
               <a:ext uri="{FF2B5EF4-FFF2-40B4-BE49-F238E27FC236}">
-                <a16:creationId xmlns="" xmlns:a16="http://schemas.microsoft.com/office/drawing/2014/main" id="{62DB0137-4B83-6740-9717-4074AFAED09F}"/>
+                <a16:creationId xmlns:a16="http://schemas.microsoft.com/office/drawing/2014/main" xmlns="" id="{62DB0137-4B83-6740-9717-4074AFAED09F}"/>
               </a:ext>
             </a:extLst>
           </p:cNvPr>
@@ -3174,7 +3174,7 @@
           <p:cNvPr id="12" name="Slide Number Placeholder 4">
             <a:extLst>
               <a:ext uri="{FF2B5EF4-FFF2-40B4-BE49-F238E27FC236}">
-                <a16:creationId xmlns="" xmlns:a16="http://schemas.microsoft.com/office/drawing/2014/main" id="{A2C3A02E-F82F-EB4D-AA11-F0AB465E4529}"/>
+                <a16:creationId xmlns:a16="http://schemas.microsoft.com/office/drawing/2014/main" xmlns="" id="{A2C3A02E-F82F-EB4D-AA11-F0AB465E4529}"/>
               </a:ext>
             </a:extLst>
           </p:cNvPr>
@@ -3217,7 +3217,7 @@
           <p:cNvPr id="9" name="Picture 8">
             <a:extLst>
               <a:ext uri="{FF2B5EF4-FFF2-40B4-BE49-F238E27FC236}">
-                <a16:creationId xmlns="" xmlns:a16="http://schemas.microsoft.com/office/drawing/2014/main" id="{59D77EAE-7535-D344-A09B-3EC1D6BA9399}"/>
+                <a16:creationId xmlns:a16="http://schemas.microsoft.com/office/drawing/2014/main" xmlns="" id="{59D77EAE-7535-D344-A09B-3EC1D6BA9399}"/>
               </a:ext>
             </a:extLst>
           </p:cNvPr>
@@ -3247,7 +3247,7 @@
           <p:cNvPr id="13" name="Title 1">
             <a:extLst>
               <a:ext uri="{FF2B5EF4-FFF2-40B4-BE49-F238E27FC236}">
-                <a16:creationId xmlns="" xmlns:a16="http://schemas.microsoft.com/office/drawing/2014/main" id="{2258039E-D7E6-874C-986C-F6066D55B1D5}"/>
+                <a16:creationId xmlns:a16="http://schemas.microsoft.com/office/drawing/2014/main" xmlns="" id="{2258039E-D7E6-874C-986C-F6066D55B1D5}"/>
               </a:ext>
             </a:extLst>
           </p:cNvPr>
@@ -3290,7 +3290,7 @@
           <p:cNvPr id="3" name="Chart Placeholder 2">
             <a:extLst>
               <a:ext uri="{FF2B5EF4-FFF2-40B4-BE49-F238E27FC236}">
-                <a16:creationId xmlns="" xmlns:a16="http://schemas.microsoft.com/office/drawing/2014/main" id="{4F5843D8-3A8D-C34A-B877-27577E457994}"/>
+                <a16:creationId xmlns:a16="http://schemas.microsoft.com/office/drawing/2014/main" xmlns="" id="{4F5843D8-3A8D-C34A-B877-27577E457994}"/>
               </a:ext>
             </a:extLst>
           </p:cNvPr>
@@ -3321,7 +3321,7 @@
     </p:spTree>
     <p:extLst>
       <p:ext uri="{BB962C8B-B14F-4D97-AF65-F5344CB8AC3E}">
-        <p14:creationId xmlns="" xmlns:p14="http://schemas.microsoft.com/office/powerpoint/2010/main" val="3926419513"/>
+        <p14:creationId xmlns:p14="http://schemas.microsoft.com/office/powerpoint/2010/main" xmlns="" val="3926419513"/>
       </p:ext>
     </p:extLst>
   </p:cSld>
@@ -3329,7 +3329,7 @@
     <a:masterClrMapping/>
   </p:clrMapOvr>
   <mc:AlternateContent xmlns:mc="http://schemas.openxmlformats.org/markup-compatibility/2006">
-    <mc:Choice xmlns="" xmlns:p14="http://schemas.microsoft.com/office/powerpoint/2010/main" Requires="p14">
+    <mc:Choice xmlns:p14="http://schemas.microsoft.com/office/powerpoint/2010/main" xmlns="" Requires="p14">
       <p:transition spd="slow" p14:dur="2000" advClick="0" advTm="5000"/>
     </mc:Choice>
     <mc:Fallback>
@@ -3361,7 +3361,7 @@
           <p:cNvPr id="4" name="Picture 3">
             <a:extLst>
               <a:ext uri="{FF2B5EF4-FFF2-40B4-BE49-F238E27FC236}">
-                <a16:creationId xmlns="" xmlns:a16="http://schemas.microsoft.com/office/drawing/2014/main" id="{62DB0137-4B83-6740-9717-4074AFAED09F}"/>
+                <a16:creationId xmlns:a16="http://schemas.microsoft.com/office/drawing/2014/main" xmlns="" id="{62DB0137-4B83-6740-9717-4074AFAED09F}"/>
               </a:ext>
             </a:extLst>
           </p:cNvPr>
@@ -3391,7 +3391,7 @@
           <p:cNvPr id="12" name="Slide Number Placeholder 4">
             <a:extLst>
               <a:ext uri="{FF2B5EF4-FFF2-40B4-BE49-F238E27FC236}">
-                <a16:creationId xmlns="" xmlns:a16="http://schemas.microsoft.com/office/drawing/2014/main" id="{A2C3A02E-F82F-EB4D-AA11-F0AB465E4529}"/>
+                <a16:creationId xmlns:a16="http://schemas.microsoft.com/office/drawing/2014/main" xmlns="" id="{A2C3A02E-F82F-EB4D-AA11-F0AB465E4529}"/>
               </a:ext>
             </a:extLst>
           </p:cNvPr>
@@ -3434,7 +3434,7 @@
           <p:cNvPr id="9" name="Picture 8">
             <a:extLst>
               <a:ext uri="{FF2B5EF4-FFF2-40B4-BE49-F238E27FC236}">
-                <a16:creationId xmlns="" xmlns:a16="http://schemas.microsoft.com/office/drawing/2014/main" id="{59D77EAE-7535-D344-A09B-3EC1D6BA9399}"/>
+                <a16:creationId xmlns:a16="http://schemas.microsoft.com/office/drawing/2014/main" xmlns="" id="{59D77EAE-7535-D344-A09B-3EC1D6BA9399}"/>
               </a:ext>
             </a:extLst>
           </p:cNvPr>
@@ -3464,7 +3464,7 @@
           <p:cNvPr id="13" name="Title 1">
             <a:extLst>
               <a:ext uri="{FF2B5EF4-FFF2-40B4-BE49-F238E27FC236}">
-                <a16:creationId xmlns="" xmlns:a16="http://schemas.microsoft.com/office/drawing/2014/main" id="{2258039E-D7E6-874C-986C-F6066D55B1D5}"/>
+                <a16:creationId xmlns:a16="http://schemas.microsoft.com/office/drawing/2014/main" xmlns="" id="{2258039E-D7E6-874C-986C-F6066D55B1D5}"/>
               </a:ext>
             </a:extLst>
           </p:cNvPr>
@@ -3507,7 +3507,7 @@
           <p:cNvPr id="5" name="Table Placeholder 4">
             <a:extLst>
               <a:ext uri="{FF2B5EF4-FFF2-40B4-BE49-F238E27FC236}">
-                <a16:creationId xmlns="" xmlns:a16="http://schemas.microsoft.com/office/drawing/2014/main" id="{7CF49F7B-6D68-A545-98FE-22FBD56818DB}"/>
+                <a16:creationId xmlns:a16="http://schemas.microsoft.com/office/drawing/2014/main" xmlns="" id="{7CF49F7B-6D68-A545-98FE-22FBD56818DB}"/>
               </a:ext>
             </a:extLst>
           </p:cNvPr>
@@ -3538,7 +3538,7 @@
     </p:spTree>
     <p:extLst>
       <p:ext uri="{BB962C8B-B14F-4D97-AF65-F5344CB8AC3E}">
-        <p14:creationId xmlns="" xmlns:p14="http://schemas.microsoft.com/office/powerpoint/2010/main" val="233726489"/>
+        <p14:creationId xmlns:p14="http://schemas.microsoft.com/office/powerpoint/2010/main" xmlns="" val="233726489"/>
       </p:ext>
     </p:extLst>
   </p:cSld>
@@ -3546,7 +3546,7 @@
     <a:masterClrMapping/>
   </p:clrMapOvr>
   <mc:AlternateContent xmlns:mc="http://schemas.openxmlformats.org/markup-compatibility/2006">
-    <mc:Choice xmlns="" xmlns:p14="http://schemas.microsoft.com/office/powerpoint/2010/main" Requires="p14">
+    <mc:Choice xmlns:p14="http://schemas.microsoft.com/office/powerpoint/2010/main" xmlns="" Requires="p14">
       <p:transition spd="slow" p14:dur="2000" advClick="0" advTm="5000"/>
     </mc:Choice>
     <mc:Fallback>
@@ -3583,7 +3583,7 @@
           <p:cNvPr id="2" name="Title Placeholder 1">
             <a:extLst>
               <a:ext uri="{FF2B5EF4-FFF2-40B4-BE49-F238E27FC236}">
-                <a16:creationId xmlns="" xmlns:a16="http://schemas.microsoft.com/office/drawing/2014/main" id="{3A821DDA-2F75-B143-93FB-2C358175036C}"/>
+                <a16:creationId xmlns:a16="http://schemas.microsoft.com/office/drawing/2014/main" xmlns="" id="{3A821DDA-2F75-B143-93FB-2C358175036C}"/>
               </a:ext>
             </a:extLst>
           </p:cNvPr>
@@ -3621,7 +3621,7 @@
           <p:cNvPr id="3" name="Text Placeholder 2">
             <a:extLst>
               <a:ext uri="{FF2B5EF4-FFF2-40B4-BE49-F238E27FC236}">
-                <a16:creationId xmlns="" xmlns:a16="http://schemas.microsoft.com/office/drawing/2014/main" id="{E024324D-5F1C-BD43-893B-DCFD6AE03280}"/>
+                <a16:creationId xmlns:a16="http://schemas.microsoft.com/office/drawing/2014/main" xmlns="" id="{E024324D-5F1C-BD43-893B-DCFD6AE03280}"/>
               </a:ext>
             </a:extLst>
           </p:cNvPr>
@@ -3688,7 +3688,7 @@
           <p:cNvPr id="4" name="Date Placeholder 3">
             <a:extLst>
               <a:ext uri="{FF2B5EF4-FFF2-40B4-BE49-F238E27FC236}">
-                <a16:creationId xmlns="" xmlns:a16="http://schemas.microsoft.com/office/drawing/2014/main" id="{D53771CD-33AE-C044-A1CC-79B8BB845347}"/>
+                <a16:creationId xmlns:a16="http://schemas.microsoft.com/office/drawing/2014/main" xmlns="" id="{D53771CD-33AE-C044-A1CC-79B8BB845347}"/>
               </a:ext>
             </a:extLst>
           </p:cNvPr>
@@ -3725,7 +3725,7 @@
             <a:fld id="{FBF4D725-7178-D948-AA3E-6F5F17353337}" type="datetimeFigureOut">
               <a:rPr lang="en-US" smtClean="0"/>
               <a:pPr/>
-              <a:t>10/22/2024</a:t>
+              <a:t>10/31/2024</a:t>
             </a:fld>
             <a:endParaRPr lang="en-US"/>
           </a:p>
@@ -3736,7 +3736,7 @@
           <p:cNvPr id="5" name="Footer Placeholder 4">
             <a:extLst>
               <a:ext uri="{FF2B5EF4-FFF2-40B4-BE49-F238E27FC236}">
-                <a16:creationId xmlns="" xmlns:a16="http://schemas.microsoft.com/office/drawing/2014/main" id="{F8AD8ECD-8EE4-DE41-8FFF-8830B5D20348}"/>
+                <a16:creationId xmlns:a16="http://schemas.microsoft.com/office/drawing/2014/main" xmlns="" id="{F8AD8ECD-8EE4-DE41-8FFF-8830B5D20348}"/>
               </a:ext>
             </a:extLst>
           </p:cNvPr>
@@ -3779,7 +3779,7 @@
           <p:cNvPr id="6" name="Slide Number Placeholder 5">
             <a:extLst>
               <a:ext uri="{FF2B5EF4-FFF2-40B4-BE49-F238E27FC236}">
-                <a16:creationId xmlns="" xmlns:a16="http://schemas.microsoft.com/office/drawing/2014/main" id="{0DAC8B92-5CED-9747-9449-501492DBB804}"/>
+                <a16:creationId xmlns:a16="http://schemas.microsoft.com/office/drawing/2014/main" xmlns="" id="{0DAC8B92-5CED-9747-9449-501492DBB804}"/>
               </a:ext>
             </a:extLst>
           </p:cNvPr>
@@ -3825,7 +3825,7 @@
     </p:spTree>
     <p:extLst>
       <p:ext uri="{BB962C8B-B14F-4D97-AF65-F5344CB8AC3E}">
-        <p14:creationId xmlns="" xmlns:p14="http://schemas.microsoft.com/office/powerpoint/2010/main" val="3457181485"/>
+        <p14:creationId xmlns:p14="http://schemas.microsoft.com/office/powerpoint/2010/main" xmlns="" val="3457181485"/>
       </p:ext>
     </p:extLst>
   </p:cSld>
@@ -3842,7 +3842,7 @@
     <p:sldLayoutId id="2147483699" r:id="rId9"/>
   </p:sldLayoutIdLst>
   <mc:AlternateContent xmlns:mc="http://schemas.openxmlformats.org/markup-compatibility/2006">
-    <mc:Choice xmlns="" xmlns:p14="http://schemas.microsoft.com/office/powerpoint/2010/main" Requires="p14">
+    <mc:Choice xmlns:p14="http://schemas.microsoft.com/office/powerpoint/2010/main" xmlns="" Requires="p14">
       <p:transition spd="slow" p14:dur="2000" advClick="0" advTm="5000"/>
     </mc:Choice>
     <mc:Fallback>
@@ -4154,7 +4154,7 @@
           <p:cNvPr id="4" name="Title 3">
             <a:extLst>
               <a:ext uri="{FF2B5EF4-FFF2-40B4-BE49-F238E27FC236}">
-                <a16:creationId xmlns="" xmlns:a16="http://schemas.microsoft.com/office/drawing/2014/main" id="{C5E0BE0D-6E7F-CB36-BF6E-CB3FAB9AA219}"/>
+                <a16:creationId xmlns:a16="http://schemas.microsoft.com/office/drawing/2014/main" xmlns="" id="{C5E0BE0D-6E7F-CB36-BF6E-CB3FAB9AA219}"/>
               </a:ext>
             </a:extLst>
           </p:cNvPr>
@@ -4183,7 +4183,7 @@
           <p:cNvPr id="5" name="Text Placeholder 4">
             <a:extLst>
               <a:ext uri="{FF2B5EF4-FFF2-40B4-BE49-F238E27FC236}">
-                <a16:creationId xmlns="" xmlns:a16="http://schemas.microsoft.com/office/drawing/2014/main" id="{AEF7E49F-30CC-3ECE-B466-6B2A76D17BCA}"/>
+                <a16:creationId xmlns:a16="http://schemas.microsoft.com/office/drawing/2014/main" xmlns="" id="{AEF7E49F-30CC-3ECE-B466-6B2A76D17BCA}"/>
               </a:ext>
             </a:extLst>
           </p:cNvPr>
@@ -4210,7 +4210,7 @@
     </p:spTree>
     <p:extLst>
       <p:ext uri="{BB962C8B-B14F-4D97-AF65-F5344CB8AC3E}">
-        <p14:creationId xmlns="" xmlns:p14="http://schemas.microsoft.com/office/powerpoint/2010/main" val="3323279844"/>
+        <p14:creationId xmlns:p14="http://schemas.microsoft.com/office/powerpoint/2010/main" xmlns="" val="3323279844"/>
       </p:ext>
     </p:extLst>
   </p:cSld>
@@ -4218,7 +4218,7 @@
     <a:masterClrMapping/>
   </p:clrMapOvr>
   <mc:AlternateContent xmlns:mc="http://schemas.openxmlformats.org/markup-compatibility/2006">
-    <mc:Choice xmlns="" xmlns:p14="http://schemas.microsoft.com/office/powerpoint/2010/main" Requires="p14">
+    <mc:Choice xmlns:p14="http://schemas.microsoft.com/office/powerpoint/2010/main" xmlns="" Requires="p14">
       <p:transition spd="slow" p14:dur="2000" advClick="0" advTm="5000"/>
     </mc:Choice>
     <mc:Fallback>
@@ -4250,7 +4250,7 @@
           <p:cNvPr id="6" name="Title 1">
             <a:extLst>
               <a:ext uri="{FF2B5EF4-FFF2-40B4-BE49-F238E27FC236}">
-                <a16:creationId xmlns="" xmlns:a16="http://schemas.microsoft.com/office/drawing/2014/main" id="{1B418EE9-5198-ADC8-D99E-D10E479044CE}"/>
+                <a16:creationId xmlns:a16="http://schemas.microsoft.com/office/drawing/2014/main" xmlns="" id="{1B418EE9-5198-ADC8-D99E-D10E479044CE}"/>
               </a:ext>
             </a:extLst>
           </p:cNvPr>
@@ -4494,103 +4494,6 @@
           <a:noFill/>
         </p:spPr>
       </p:pic>
-      <p:pic>
-        <p:nvPicPr>
-          <p:cNvPr id="1042" name="Picture 18" descr="Clouds - Free weather icons"/>
-          <p:cNvPicPr>
-            <a:picLocks noChangeAspect="1" noChangeArrowheads="1"/>
-          </p:cNvPicPr>
-          <p:nvPr/>
-        </p:nvPicPr>
-        <p:blipFill>
-          <a:blip r:embed="rId6"/>
-          <a:srcRect/>
-          <a:stretch>
-            <a:fillRect/>
-          </a:stretch>
-        </p:blipFill>
-        <p:spPr bwMode="auto">
-          <a:xfrm>
-            <a:off x="3905250" y="3263899"/>
-            <a:ext cx="1085850" cy="1028701"/>
-          </a:xfrm>
-          <a:prstGeom prst="rect">
-            <a:avLst/>
-          </a:prstGeom>
-          <a:noFill/>
-        </p:spPr>
-      </p:pic>
-      <p:sp>
-        <p:nvSpPr>
-          <p:cNvPr id="24" name="TextBox 23"/>
-          <p:cNvSpPr txBox="1"/>
-          <p:nvPr/>
-        </p:nvSpPr>
-        <p:spPr>
-          <a:xfrm>
-            <a:off x="3930649" y="3587750"/>
-            <a:ext cx="1079501" cy="415498"/>
-          </a:xfrm>
-          <a:prstGeom prst="rect">
-            <a:avLst/>
-          </a:prstGeom>
-          <a:noFill/>
-        </p:spPr>
-        <p:txBody>
-          <a:bodyPr wrap="square" rtlCol="0">
-            <a:spAutoFit/>
-          </a:bodyPr>
-          <a:lstStyle/>
-          <a:p>
-            <a:pPr algn="ctr"/>
-            <a:r>
-              <a:rPr lang="en-US" sz="1000" b="1" dirty="0" smtClean="0">
-                <a:solidFill>
-                  <a:srgbClr val="000000"/>
-                </a:solidFill>
-              </a:rPr>
-              <a:t>API {</a:t>
-            </a:r>
-            <a:r>
-              <a:rPr lang="en-US" sz="800" b="1" dirty="0" smtClean="0">
-                <a:solidFill>
-                  <a:srgbClr val="000000"/>
-                </a:solidFill>
-              </a:rPr>
-              <a:t>rest</a:t>
-            </a:r>
-            <a:r>
-              <a:rPr lang="en-US" sz="1100" b="1" dirty="0" smtClean="0">
-                <a:solidFill>
-                  <a:srgbClr val="000000"/>
-                </a:solidFill>
-              </a:rPr>
-              <a:t>}</a:t>
-            </a:r>
-            <a:endParaRPr lang="en-US" sz="1000" b="1" dirty="0" smtClean="0">
-              <a:solidFill>
-                <a:srgbClr val="000000"/>
-              </a:solidFill>
-            </a:endParaRPr>
-          </a:p>
-          <a:p>
-            <a:pPr algn="ctr"/>
-            <a:r>
-              <a:rPr lang="en-US" sz="1000" b="1" dirty="0" smtClean="0">
-                <a:solidFill>
-                  <a:srgbClr val="000000"/>
-                </a:solidFill>
-              </a:rPr>
-              <a:t>Kafka Rest Proxy</a:t>
-            </a:r>
-            <a:endParaRPr lang="en-US" sz="1000" b="1" dirty="0">
-              <a:solidFill>
-                <a:srgbClr val="000000"/>
-              </a:solidFill>
-            </a:endParaRPr>
-          </a:p>
-        </p:txBody>
-      </p:sp>
       <p:sp>
         <p:nvSpPr>
           <p:cNvPr id="26" name="Rounded Rectangle 25"/>
@@ -4638,7 +4541,7 @@
           <p:nvPr/>
         </p:nvPicPr>
         <p:blipFill>
-          <a:blip r:embed="rId7"/>
+          <a:blip r:embed="rId6"/>
           <a:srcRect/>
           <a:stretch>
             <a:fillRect/>
@@ -4664,7 +4567,7 @@
           <p:nvPr/>
         </p:nvPicPr>
         <p:blipFill>
-          <a:blip r:embed="rId8"/>
+          <a:blip r:embed="rId7"/>
           <a:srcRect/>
           <a:stretch>
             <a:fillRect/>
@@ -4728,7 +4631,7 @@
           <p:nvPr/>
         </p:nvPicPr>
         <p:blipFill>
-          <a:blip r:embed="rId9"/>
+          <a:blip r:embed="rId8"/>
           <a:srcRect/>
           <a:stretch>
             <a:fillRect/>
@@ -4818,45 +4721,6 @@
           </a:fontRef>
         </p:style>
       </p:cxnSp>
-      <p:cxnSp>
-        <p:nvCxnSpPr>
-          <p:cNvPr id="59" name="Elbow Connector 58"/>
-          <p:cNvCxnSpPr>
-            <a:stCxn id="24" idx="3"/>
-            <a:endCxn id="33" idx="1"/>
-          </p:cNvCxnSpPr>
-          <p:nvPr/>
-        </p:nvCxnSpPr>
-        <p:spPr>
-          <a:xfrm flipV="1">
-            <a:off x="5010150" y="3787775"/>
-            <a:ext cx="1108075" cy="7724"/>
-          </a:xfrm>
-          <a:prstGeom prst="bentConnector3">
-            <a:avLst>
-              <a:gd name="adj1" fmla="val 50000"/>
-            </a:avLst>
-          </a:prstGeom>
-          <a:ln>
-            <a:headEnd type="arrow"/>
-            <a:tailEnd type="arrow"/>
-          </a:ln>
-        </p:spPr>
-        <p:style>
-          <a:lnRef idx="1">
-            <a:schemeClr val="accent1"/>
-          </a:lnRef>
-          <a:fillRef idx="0">
-            <a:schemeClr val="accent1"/>
-          </a:fillRef>
-          <a:effectRef idx="0">
-            <a:schemeClr val="accent1"/>
-          </a:effectRef>
-          <a:fontRef idx="minor">
-            <a:schemeClr val="tx1"/>
-          </a:fontRef>
-        </p:style>
-      </p:cxnSp>
       <p:sp>
         <p:nvSpPr>
           <p:cNvPr id="1050" name="AutoShape 26" descr="Wifi Plug - Smart WiFi Plug - CleanPNG / KissPNG"/>
@@ -4926,7 +4790,7 @@
           <p:nvPr/>
         </p:nvPicPr>
         <p:blipFill>
-          <a:blip r:embed="rId6"/>
+          <a:blip r:embed="rId9"/>
           <a:srcRect/>
           <a:stretch>
             <a:fillRect/>
@@ -5093,7 +4957,7 @@
         </p:blipFill>
         <p:spPr bwMode="auto">
           <a:xfrm>
-            <a:off x="784225" y="3267075"/>
+            <a:off x="727075" y="4492625"/>
             <a:ext cx="1844675" cy="1090869"/>
           </a:xfrm>
           <a:prstGeom prst="rect">
@@ -5111,53 +4975,13 @@
       </p:pic>
       <p:sp>
         <p:nvSpPr>
-          <p:cNvPr id="125" name="Up-Down Arrow 124"/>
-          <p:cNvSpPr/>
-          <p:nvPr/>
-        </p:nvSpPr>
-        <p:spPr>
-          <a:xfrm>
-            <a:off x="4362450" y="4191000"/>
-            <a:ext cx="177800" cy="577850"/>
-          </a:xfrm>
-          <a:prstGeom prst="upDownArrow">
-            <a:avLst/>
-          </a:prstGeom>
-        </p:spPr>
-        <p:style>
-          <a:lnRef idx="2">
-            <a:schemeClr val="accent1">
-              <a:shade val="50000"/>
-            </a:schemeClr>
-          </a:lnRef>
-          <a:fillRef idx="1">
-            <a:schemeClr val="accent1"/>
-          </a:fillRef>
-          <a:effectRef idx="0">
-            <a:schemeClr val="accent1"/>
-          </a:effectRef>
-          <a:fontRef idx="minor">
-            <a:schemeClr val="lt1"/>
-          </a:fontRef>
-        </p:style>
-        <p:txBody>
-          <a:bodyPr rtlCol="0" anchor="ctr"/>
-          <a:lstStyle/>
-          <a:p>
-            <a:pPr algn="ctr"/>
-            <a:endParaRPr lang="en-US"/>
-          </a:p>
-        </p:txBody>
-      </p:sp>
-      <p:sp>
-        <p:nvSpPr>
           <p:cNvPr id="126" name="Right Arrow 125"/>
           <p:cNvSpPr/>
           <p:nvPr/>
         </p:nvSpPr>
         <p:spPr>
           <a:xfrm>
-            <a:off x="2844800" y="3745231"/>
+            <a:off x="2749550" y="4977131"/>
             <a:ext cx="927100" cy="185419"/>
           </a:xfrm>
           <a:prstGeom prst="rightArrow">
@@ -5378,7 +5202,7 @@
     <a:masterClrMapping/>
   </p:clrMapOvr>
   <mc:AlternateContent xmlns:mc="http://schemas.openxmlformats.org/markup-compatibility/2006">
-    <mc:Choice xmlns="" xmlns:p14="http://schemas.microsoft.com/office/powerpoint/2010/main" Requires="p14">
+    <mc:Choice xmlns:p14="http://schemas.microsoft.com/office/powerpoint/2010/main" xmlns="" Requires="p14">
       <p:transition spd="slow" p14:dur="2000" advClick="0" advTm="5000"/>
     </mc:Choice>
     <mc:Fallback>
@@ -5410,7 +5234,7 @@
           <p:cNvPr id="2" name="TextBox 1">
             <a:extLst>
               <a:ext uri="{FF2B5EF4-FFF2-40B4-BE49-F238E27FC236}">
-                <a16:creationId xmlns="" xmlns:a16="http://schemas.microsoft.com/office/drawing/2014/main" id="{5E8D481B-AA70-47B2-D724-B872B2D97377}"/>
+                <a16:creationId xmlns:a16="http://schemas.microsoft.com/office/drawing/2014/main" xmlns="" id="{5E8D481B-AA70-47B2-D724-B872B2D97377}"/>
               </a:ext>
             </a:extLst>
           </p:cNvPr>
@@ -5475,7 +5299,7 @@
     </p:spTree>
     <p:extLst>
       <p:ext uri="{BB962C8B-B14F-4D97-AF65-F5344CB8AC3E}">
-        <p14:creationId xmlns="" xmlns:p14="http://schemas.microsoft.com/office/powerpoint/2010/main" val="3511436495"/>
+        <p14:creationId xmlns:p14="http://schemas.microsoft.com/office/powerpoint/2010/main" xmlns="" val="3511436495"/>
       </p:ext>
     </p:extLst>
   </p:cSld>
@@ -5483,7 +5307,7 @@
     <a:masterClrMapping/>
   </p:clrMapOvr>
   <mc:AlternateContent xmlns:mc="http://schemas.openxmlformats.org/markup-compatibility/2006">
-    <mc:Choice xmlns="" xmlns:p14="http://schemas.microsoft.com/office/powerpoint/2010/main" Requires="p14">
+    <mc:Choice xmlns:p14="http://schemas.microsoft.com/office/powerpoint/2010/main" xmlns="" Requires="p14">
       <p:transition spd="slow" p14:dur="2000" advClick="0" advTm="5000"/>
     </mc:Choice>
     <mc:Fallback>
@@ -5515,7 +5339,7 @@
           <p:cNvPr id="4" name="Title 3">
             <a:extLst>
               <a:ext uri="{FF2B5EF4-FFF2-40B4-BE49-F238E27FC236}">
-                <a16:creationId xmlns="" xmlns:a16="http://schemas.microsoft.com/office/drawing/2014/main" id="{7DEAF21D-E8CE-AD8B-E648-301FB7DE61DF}"/>
+                <a16:creationId xmlns:a16="http://schemas.microsoft.com/office/drawing/2014/main" xmlns="" id="{7DEAF21D-E8CE-AD8B-E648-301FB7DE61DF}"/>
               </a:ext>
             </a:extLst>
           </p:cNvPr>
@@ -5543,7 +5367,7 @@
           <p:cNvPr id="5" name="Text Placeholder 4">
             <a:extLst>
               <a:ext uri="{FF2B5EF4-FFF2-40B4-BE49-F238E27FC236}">
-                <a16:creationId xmlns="" xmlns:a16="http://schemas.microsoft.com/office/drawing/2014/main" id="{218E70D0-E766-7711-25D8-1588E232CEC8}"/>
+                <a16:creationId xmlns:a16="http://schemas.microsoft.com/office/drawing/2014/main" xmlns="" id="{218E70D0-E766-7711-25D8-1588E232CEC8}"/>
               </a:ext>
             </a:extLst>
           </p:cNvPr>
@@ -5603,7 +5427,7 @@
     </p:spTree>
     <p:extLst>
       <p:ext uri="{BB962C8B-B14F-4D97-AF65-F5344CB8AC3E}">
-        <p14:creationId xmlns="" xmlns:p14="http://schemas.microsoft.com/office/powerpoint/2010/main" val="2639129120"/>
+        <p14:creationId xmlns:p14="http://schemas.microsoft.com/office/powerpoint/2010/main" xmlns="" val="2639129120"/>
       </p:ext>
     </p:extLst>
   </p:cSld>
@@ -5611,7 +5435,7 @@
     <a:masterClrMapping/>
   </p:clrMapOvr>
   <mc:AlternateContent xmlns:mc="http://schemas.openxmlformats.org/markup-compatibility/2006">
-    <mc:Choice xmlns="" xmlns:p14="http://schemas.microsoft.com/office/powerpoint/2010/main" Requires="p14">
+    <mc:Choice xmlns:p14="http://schemas.microsoft.com/office/powerpoint/2010/main" xmlns="" Requires="p14">
       <p:transition spd="slow" p14:dur="2000" advClick="0" advTm="5000"/>
     </mc:Choice>
     <mc:Fallback>
@@ -5643,7 +5467,7 @@
           <p:cNvPr id="8" name="Title 7">
             <a:extLst>
               <a:ext uri="{FF2B5EF4-FFF2-40B4-BE49-F238E27FC236}">
-                <a16:creationId xmlns="" xmlns:a16="http://schemas.microsoft.com/office/drawing/2014/main" id="{8BD644B9-9C1E-39C5-E757-82FE5465A6E9}"/>
+                <a16:creationId xmlns:a16="http://schemas.microsoft.com/office/drawing/2014/main" xmlns="" id="{8BD644B9-9C1E-39C5-E757-82FE5465A6E9}"/>
               </a:ext>
             </a:extLst>
           </p:cNvPr>
@@ -5690,7 +5514,7 @@
           <p:cNvPr id="9" name="Subtitle 2">
             <a:extLst>
               <a:ext uri="{FF2B5EF4-FFF2-40B4-BE49-F238E27FC236}">
-                <a16:creationId xmlns="" xmlns:a16="http://schemas.microsoft.com/office/drawing/2014/main" id="{8F968626-82D8-2F5F-6869-21D8AD224898}"/>
+                <a16:creationId xmlns:a16="http://schemas.microsoft.com/office/drawing/2014/main" xmlns="" id="{8F968626-82D8-2F5F-6869-21D8AD224898}"/>
               </a:ext>
             </a:extLst>
           </p:cNvPr>
@@ -5754,7 +5578,7 @@
           <p:cNvPr id="4" name="Text Placeholder 4">
             <a:extLst>
               <a:ext uri="{FF2B5EF4-FFF2-40B4-BE49-F238E27FC236}">
-                <a16:creationId xmlns="" xmlns:a16="http://schemas.microsoft.com/office/drawing/2014/main" id="{218E70D0-E766-7711-25D8-1588E232CEC8}"/>
+                <a16:creationId xmlns:a16="http://schemas.microsoft.com/office/drawing/2014/main" xmlns="" id="{218E70D0-E766-7711-25D8-1588E232CEC8}"/>
               </a:ext>
             </a:extLst>
           </p:cNvPr>
@@ -5813,7 +5637,7 @@
           <p:cNvPr id="5" name="Text Placeholder 4">
             <a:extLst>
               <a:ext uri="{FF2B5EF4-FFF2-40B4-BE49-F238E27FC236}">
-                <a16:creationId xmlns="" xmlns:a16="http://schemas.microsoft.com/office/drawing/2014/main" id="{218E70D0-E766-7711-25D8-1588E232CEC8}"/>
+                <a16:creationId xmlns:a16="http://schemas.microsoft.com/office/drawing/2014/main" xmlns="" id="{218E70D0-E766-7711-25D8-1588E232CEC8}"/>
               </a:ext>
             </a:extLst>
           </p:cNvPr>
@@ -5951,7 +5775,7 @@
     </p:spTree>
     <p:extLst>
       <p:ext uri="{BB962C8B-B14F-4D97-AF65-F5344CB8AC3E}">
-        <p14:creationId xmlns="" xmlns:p14="http://schemas.microsoft.com/office/powerpoint/2010/main" val="479653768"/>
+        <p14:creationId xmlns:p14="http://schemas.microsoft.com/office/powerpoint/2010/main" xmlns="" val="479653768"/>
       </p:ext>
     </p:extLst>
   </p:cSld>
@@ -5959,7 +5783,7 @@
     <a:masterClrMapping/>
   </p:clrMapOvr>
   <mc:AlternateContent xmlns:mc="http://schemas.openxmlformats.org/markup-compatibility/2006">
-    <mc:Choice xmlns="" xmlns:p14="http://schemas.microsoft.com/office/powerpoint/2010/main" Requires="p14">
+    <mc:Choice xmlns:p14="http://schemas.microsoft.com/office/powerpoint/2010/main" xmlns="" Requires="p14">
       <p:transition spd="slow" p14:dur="2000" advClick="0" advTm="5000"/>
     </mc:Choice>
     <mc:Fallback>
@@ -5991,7 +5815,7 @@
           <p:cNvPr id="2" name="Title 1">
             <a:extLst>
               <a:ext uri="{FF2B5EF4-FFF2-40B4-BE49-F238E27FC236}">
-                <a16:creationId xmlns="" xmlns:a16="http://schemas.microsoft.com/office/drawing/2014/main" id="{1B418EE9-5198-ADC8-D99E-D10E479044CE}"/>
+                <a16:creationId xmlns:a16="http://schemas.microsoft.com/office/drawing/2014/main" xmlns="" id="{1B418EE9-5198-ADC8-D99E-D10E479044CE}"/>
               </a:ext>
             </a:extLst>
           </p:cNvPr>
@@ -6029,7 +5853,7 @@
           <p:cNvPr id="4" name="TextBox 3">
             <a:extLst>
               <a:ext uri="{FF2B5EF4-FFF2-40B4-BE49-F238E27FC236}">
-                <a16:creationId xmlns="" xmlns:a16="http://schemas.microsoft.com/office/drawing/2014/main" id="{221FA16E-AAC8-1A73-CCDA-27D1070D6804}"/>
+                <a16:creationId xmlns:a16="http://schemas.microsoft.com/office/drawing/2014/main" xmlns="" id="{221FA16E-AAC8-1A73-CCDA-27D1070D6804}"/>
               </a:ext>
             </a:extLst>
           </p:cNvPr>
@@ -6159,7 +5983,7 @@
     </p:spTree>
     <p:extLst>
       <p:ext uri="{BB962C8B-B14F-4D97-AF65-F5344CB8AC3E}">
-        <p14:creationId xmlns="" xmlns:p14="http://schemas.microsoft.com/office/powerpoint/2010/main" val="1960280140"/>
+        <p14:creationId xmlns:p14="http://schemas.microsoft.com/office/powerpoint/2010/main" xmlns="" val="1960280140"/>
       </p:ext>
     </p:extLst>
   </p:cSld>
@@ -6167,7 +5991,7 @@
     <a:masterClrMapping/>
   </p:clrMapOvr>
   <mc:AlternateContent xmlns:mc="http://schemas.openxmlformats.org/markup-compatibility/2006">
-    <mc:Choice xmlns="" xmlns:p14="http://schemas.microsoft.com/office/powerpoint/2010/main" Requires="p14">
+    <mc:Choice xmlns:p14="http://schemas.microsoft.com/office/powerpoint/2010/main" xmlns="" Requires="p14">
       <p:transition spd="slow" p14:dur="2000" advClick="0" advTm="5000"/>
     </mc:Choice>
     <mc:Fallback>
@@ -6199,7 +6023,7 @@
           <p:cNvPr id="2" name="Title 1">
             <a:extLst>
               <a:ext uri="{FF2B5EF4-FFF2-40B4-BE49-F238E27FC236}">
-                <a16:creationId xmlns="" xmlns:a16="http://schemas.microsoft.com/office/drawing/2014/main" id="{1B418EE9-5198-ADC8-D99E-D10E479044CE}"/>
+                <a16:creationId xmlns:a16="http://schemas.microsoft.com/office/drawing/2014/main" xmlns="" id="{1B418EE9-5198-ADC8-D99E-D10E479044CE}"/>
               </a:ext>
             </a:extLst>
           </p:cNvPr>
@@ -6237,7 +6061,7 @@
           <p:cNvPr id="4" name="TextBox 3">
             <a:extLst>
               <a:ext uri="{FF2B5EF4-FFF2-40B4-BE49-F238E27FC236}">
-                <a16:creationId xmlns="" xmlns:a16="http://schemas.microsoft.com/office/drawing/2014/main" id="{221FA16E-AAC8-1A73-CCDA-27D1070D6804}"/>
+                <a16:creationId xmlns:a16="http://schemas.microsoft.com/office/drawing/2014/main" xmlns="" id="{221FA16E-AAC8-1A73-CCDA-27D1070D6804}"/>
               </a:ext>
             </a:extLst>
           </p:cNvPr>
@@ -6327,7 +6151,7 @@
     </p:spTree>
     <p:extLst>
       <p:ext uri="{BB962C8B-B14F-4D97-AF65-F5344CB8AC3E}">
-        <p14:creationId xmlns="" xmlns:p14="http://schemas.microsoft.com/office/powerpoint/2010/main" val="1960280140"/>
+        <p14:creationId xmlns:p14="http://schemas.microsoft.com/office/powerpoint/2010/main" xmlns="" val="1960280140"/>
       </p:ext>
     </p:extLst>
   </p:cSld>
@@ -6335,7 +6159,7 @@
     <a:masterClrMapping/>
   </p:clrMapOvr>
   <mc:AlternateContent xmlns:mc="http://schemas.openxmlformats.org/markup-compatibility/2006">
-    <mc:Choice xmlns="" xmlns:p14="http://schemas.microsoft.com/office/powerpoint/2010/main" Requires="p14">
+    <mc:Choice xmlns:p14="http://schemas.microsoft.com/office/powerpoint/2010/main" xmlns="" Requires="p14">
       <p:transition spd="slow" p14:dur="2000" advClick="0" advTm="5000"/>
     </mc:Choice>
     <mc:Fallback>
@@ -6367,7 +6191,7 @@
           <p:cNvPr id="6" name="Title 1">
             <a:extLst>
               <a:ext uri="{FF2B5EF4-FFF2-40B4-BE49-F238E27FC236}">
-                <a16:creationId xmlns="" xmlns:a16="http://schemas.microsoft.com/office/drawing/2014/main" id="{1B418EE9-5198-ADC8-D99E-D10E479044CE}"/>
+                <a16:creationId xmlns:a16="http://schemas.microsoft.com/office/drawing/2014/main" xmlns="" id="{1B418EE9-5198-ADC8-D99E-D10E479044CE}"/>
               </a:ext>
             </a:extLst>
           </p:cNvPr>
@@ -6475,7 +6299,7 @@
     </p:spTree>
     <p:extLst>
       <p:ext uri="{BB962C8B-B14F-4D97-AF65-F5344CB8AC3E}">
-        <p14:creationId xmlns="" xmlns:p14="http://schemas.microsoft.com/office/powerpoint/2010/main" val="1259160530"/>
+        <p14:creationId xmlns:p14="http://schemas.microsoft.com/office/powerpoint/2010/main" xmlns="" val="1259160530"/>
       </p:ext>
     </p:extLst>
   </p:cSld>
@@ -6483,7 +6307,7 @@
     <a:masterClrMapping/>
   </p:clrMapOvr>
   <mc:AlternateContent xmlns:mc="http://schemas.openxmlformats.org/markup-compatibility/2006">
-    <mc:Choice xmlns="" xmlns:p14="http://schemas.microsoft.com/office/powerpoint/2010/main" Requires="p14">
+    <mc:Choice xmlns:p14="http://schemas.microsoft.com/office/powerpoint/2010/main" xmlns="" Requires="p14">
       <p:transition spd="slow" p14:dur="2000" advClick="0" advTm="5000"/>
     </mc:Choice>
     <mc:Fallback>
@@ -6515,7 +6339,7 @@
           <p:cNvPr id="2" name="Title 1">
             <a:extLst>
               <a:ext uri="{FF2B5EF4-FFF2-40B4-BE49-F238E27FC236}">
-                <a16:creationId xmlns="" xmlns:a16="http://schemas.microsoft.com/office/drawing/2014/main" id="{1B418EE9-5198-ADC8-D99E-D10E479044CE}"/>
+                <a16:creationId xmlns:a16="http://schemas.microsoft.com/office/drawing/2014/main" xmlns="" id="{1B418EE9-5198-ADC8-D99E-D10E479044CE}"/>
               </a:ext>
             </a:extLst>
           </p:cNvPr>
@@ -6553,7 +6377,7 @@
           <p:cNvPr id="4" name="TextBox 3">
             <a:extLst>
               <a:ext uri="{FF2B5EF4-FFF2-40B4-BE49-F238E27FC236}">
-                <a16:creationId xmlns="" xmlns:a16="http://schemas.microsoft.com/office/drawing/2014/main" id="{221FA16E-AAC8-1A73-CCDA-27D1070D6804}"/>
+                <a16:creationId xmlns:a16="http://schemas.microsoft.com/office/drawing/2014/main" xmlns="" id="{221FA16E-AAC8-1A73-CCDA-27D1070D6804}"/>
               </a:ext>
             </a:extLst>
           </p:cNvPr>
@@ -6984,7 +6808,7 @@
     </p:spTree>
     <p:extLst>
       <p:ext uri="{BB962C8B-B14F-4D97-AF65-F5344CB8AC3E}">
-        <p14:creationId xmlns="" xmlns:p14="http://schemas.microsoft.com/office/powerpoint/2010/main" val="1960280140"/>
+        <p14:creationId xmlns:p14="http://schemas.microsoft.com/office/powerpoint/2010/main" xmlns="" val="1960280140"/>
       </p:ext>
     </p:extLst>
   </p:cSld>
@@ -6992,7 +6816,7 @@
     <a:masterClrMapping/>
   </p:clrMapOvr>
   <mc:AlternateContent xmlns:mc="http://schemas.openxmlformats.org/markup-compatibility/2006">
-    <mc:Choice xmlns="" xmlns:p14="http://schemas.microsoft.com/office/powerpoint/2010/main" Requires="p14">
+    <mc:Choice xmlns:p14="http://schemas.microsoft.com/office/powerpoint/2010/main" xmlns="" Requires="p14">
       <p:transition spd="slow" p14:dur="2000" advClick="0" advTm="5000"/>
     </mc:Choice>
     <mc:Fallback>
@@ -7024,7 +6848,7 @@
           <p:cNvPr id="2" name="Title 1">
             <a:extLst>
               <a:ext uri="{FF2B5EF4-FFF2-40B4-BE49-F238E27FC236}">
-                <a16:creationId xmlns="" xmlns:a16="http://schemas.microsoft.com/office/drawing/2014/main" id="{1B418EE9-5198-ADC8-D99E-D10E479044CE}"/>
+                <a16:creationId xmlns:a16="http://schemas.microsoft.com/office/drawing/2014/main" xmlns="" id="{1B418EE9-5198-ADC8-D99E-D10E479044CE}"/>
               </a:ext>
             </a:extLst>
           </p:cNvPr>
@@ -7062,7 +6886,7 @@
           <p:cNvPr id="4" name="TextBox 3">
             <a:extLst>
               <a:ext uri="{FF2B5EF4-FFF2-40B4-BE49-F238E27FC236}">
-                <a16:creationId xmlns="" xmlns:a16="http://schemas.microsoft.com/office/drawing/2014/main" id="{221FA16E-AAC8-1A73-CCDA-27D1070D6804}"/>
+                <a16:creationId xmlns:a16="http://schemas.microsoft.com/office/drawing/2014/main" xmlns="" id="{221FA16E-AAC8-1A73-CCDA-27D1070D6804}"/>
               </a:ext>
             </a:extLst>
           </p:cNvPr>
@@ -7499,7 +7323,7 @@
     </p:spTree>
     <p:extLst>
       <p:ext uri="{BB962C8B-B14F-4D97-AF65-F5344CB8AC3E}">
-        <p14:creationId xmlns="" xmlns:p14="http://schemas.microsoft.com/office/powerpoint/2010/main" val="1960280140"/>
+        <p14:creationId xmlns:p14="http://schemas.microsoft.com/office/powerpoint/2010/main" xmlns="" val="1960280140"/>
       </p:ext>
     </p:extLst>
   </p:cSld>
@@ -7507,7 +7331,7 @@
     <a:masterClrMapping/>
   </p:clrMapOvr>
   <mc:AlternateContent xmlns:mc="http://schemas.openxmlformats.org/markup-compatibility/2006">
-    <mc:Choice xmlns="" xmlns:p14="http://schemas.microsoft.com/office/powerpoint/2010/main" Requires="p14">
+    <mc:Choice xmlns:p14="http://schemas.microsoft.com/office/powerpoint/2010/main" xmlns="" Requires="p14">
       <p:transition spd="slow" p14:dur="2000" advClick="0" advTm="5000"/>
     </mc:Choice>
     <mc:Fallback>
@@ -7539,7 +7363,7 @@
           <p:cNvPr id="6" name="Title 1">
             <a:extLst>
               <a:ext uri="{FF2B5EF4-FFF2-40B4-BE49-F238E27FC236}">
-                <a16:creationId xmlns="" xmlns:a16="http://schemas.microsoft.com/office/drawing/2014/main" id="{1B418EE9-5198-ADC8-D99E-D10E479044CE}"/>
+                <a16:creationId xmlns:a16="http://schemas.microsoft.com/office/drawing/2014/main" xmlns="" id="{1B418EE9-5198-ADC8-D99E-D10E479044CE}"/>
               </a:ext>
             </a:extLst>
           </p:cNvPr>
@@ -7888,7 +7712,7 @@
     <a:masterClrMapping/>
   </p:clrMapOvr>
   <mc:AlternateContent xmlns:mc="http://schemas.openxmlformats.org/markup-compatibility/2006">
-    <mc:Choice xmlns="" xmlns:p14="http://schemas.microsoft.com/office/powerpoint/2010/main" Requires="p14">
+    <mc:Choice xmlns:p14="http://schemas.microsoft.com/office/powerpoint/2010/main" xmlns="" Requires="p14">
       <p:transition spd="slow" p14:dur="2000" advClick="0" advTm="5000"/>
     </mc:Choice>
     <mc:Fallback>
@@ -8187,7 +8011,7 @@
   <a:extraClrSchemeLst/>
   <a:extLst>
     <a:ext uri="{05A4C25C-085E-4340-85A3-A5531E510DB2}">
-      <thm15:themeFamily xmlns="" xmlns:thm15="http://schemas.microsoft.com/office/thememl/2012/main" name="18-Brand-Standards-Corporate-Template-R01  -  Repaired" id="{7628EEB4-EE5B-45F0-B1DA-E888BA5DCC7D}" vid="{48500A91-5F3F-4738-B9EF-D77D3C06827C}"/>
+      <thm15:themeFamily xmlns:thm15="http://schemas.microsoft.com/office/thememl/2012/main" xmlns="" name="18-Brand-Standards-Corporate-Template-R01  -  Repaired" id="{7628EEB4-EE5B-45F0-B1DA-E888BA5DCC7D}" vid="{48500A91-5F3F-4738-B9EF-D77D3C06827C}"/>
     </a:ext>
   </a:extLst>
 </a:theme>
@@ -8482,7 +8306,7 @@
   <a:extraClrSchemeLst/>
   <a:extLst>
     <a:ext uri="{05A4C25C-085E-4340-85A3-A5531E510DB2}">
-      <thm15:themeFamily xmlns="" xmlns:thm15="http://schemas.microsoft.com/office/thememl/2012/main" name="Office Theme" id="{62F939B6-93AF-4DB8-9C6B-D6C7DFDC589F}" vid="{4A3C46E8-61CC-4603-A589-7422A47A8E4A}"/>
+      <thm15:themeFamily xmlns:thm15="http://schemas.microsoft.com/office/thememl/2012/main" xmlns="" name="Office Theme" id="{62F939B6-93AF-4DB8-9C6B-D6C7DFDC589F}" vid="{4A3C46E8-61CC-4603-A589-7422A47A8E4A}"/>
     </a:ext>
   </a:extLst>
 </a:theme>
@@ -8777,13 +8601,33 @@
   <a:extraClrSchemeLst/>
   <a:extLst>
     <a:ext uri="{05A4C25C-085E-4340-85A3-A5531E510DB2}">
-      <thm15:themeFamily xmlns="" xmlns:thm15="http://schemas.microsoft.com/office/thememl/2012/main" name="Office Theme" id="{62F939B6-93AF-4DB8-9C6B-D6C7DFDC589F}" vid="{4A3C46E8-61CC-4603-A589-7422A47A8E4A}"/>
+      <thm15:themeFamily xmlns:thm15="http://schemas.microsoft.com/office/thememl/2012/main" xmlns="" name="Office Theme" id="{62F939B6-93AF-4DB8-9C6B-D6C7DFDC589F}" vid="{4A3C46E8-61CC-4603-A589-7422A47A8E4A}"/>
     </a:ext>
   </a:extLst>
 </a:theme>
 </file>
 
 <file path=customXml/item1.xml><?xml version="1.0" encoding="utf-8"?>
+<?mso-contentType ?>
+<FormTemplates xmlns="http://schemas.microsoft.com/sharepoint/v3/contenttype/forms">
+  <Display>DocumentLibraryForm</Display>
+  <Edit>DocumentLibraryForm</Edit>
+  <New>DocumentLibraryForm</New>
+</FormTemplates>
+</file>
+
+<file path=customXml/item2.xml><?xml version="1.0" encoding="utf-8"?>
+<p:properties xmlns:p="http://schemas.microsoft.com/office/2006/metadata/properties" xmlns:xsi="http://www.w3.org/2001/XMLSchema-instance" xmlns:pc="http://schemas.microsoft.com/office/infopath/2007/PartnerControls">
+  <documentManagement>
+    <lcf76f155ced4ddcb4097134ff3c332f xmlns="80cd682b-b40f-411e-9891-5e2a388e0f2a">
+      <Terms xmlns="http://schemas.microsoft.com/office/infopath/2007/PartnerControls"/>
+    </lcf76f155ced4ddcb4097134ff3c332f>
+    <TaxCatchAll xmlns="0a5436c3-62bb-42e4-abd1-a0a4955fdeca" xsi:nil="true"/>
+  </documentManagement>
+</p:properties>
+</file>
+
+<file path=customXml/item3.xml><?xml version="1.0" encoding="utf-8"?>
 <ct:contentTypeSchema xmlns:ct="http://schemas.microsoft.com/office/2006/metadata/contentType" xmlns:ma="http://schemas.microsoft.com/office/2006/metadata/properties/metaAttributes" ct:_="" ma:_="" ma:contentTypeName="Document" ma:contentTypeID="0x010100E88E7F3DB7B651438BE2EE6496C5288F" ma:contentTypeVersion="15" ma:contentTypeDescription="Create a new document." ma:contentTypeScope="" ma:versionID="f84292184f4f7fbb88c788eaae096a70">
   <xsd:schema xmlns:xsd="http://www.w3.org/2001/XMLSchema" xmlns:xs="http://www.w3.org/2001/XMLSchema" xmlns:p="http://schemas.microsoft.com/office/2006/metadata/properties" xmlns:ns2="80cd682b-b40f-411e-9891-5e2a388e0f2a" xmlns:ns3="0a5436c3-62bb-42e4-abd1-a0a4955fdeca" targetNamespace="http://schemas.microsoft.com/office/2006/metadata/properties" ma:root="true" ma:fieldsID="a80ffcda42bd2f74d943b42b148c0425" ns2:_="" ns3:_="">
     <xsd:import namespace="80cd682b-b40f-411e-9891-5e2a388e0f2a"/>
@@ -9014,41 +8858,10 @@
 </ct:contentTypeSchema>
 </file>
 
-<file path=customXml/item2.xml><?xml version="1.0" encoding="utf-8"?>
-<p:properties xmlns:p="http://schemas.microsoft.com/office/2006/metadata/properties" xmlns:xsi="http://www.w3.org/2001/XMLSchema-instance" xmlns:pc="http://schemas.microsoft.com/office/infopath/2007/PartnerControls">
-  <documentManagement>
-    <lcf76f155ced4ddcb4097134ff3c332f xmlns="80cd682b-b40f-411e-9891-5e2a388e0f2a">
-      <Terms xmlns="http://schemas.microsoft.com/office/infopath/2007/PartnerControls"/>
-    </lcf76f155ced4ddcb4097134ff3c332f>
-    <TaxCatchAll xmlns="0a5436c3-62bb-42e4-abd1-a0a4955fdeca" xsi:nil="true"/>
-  </documentManagement>
-</p:properties>
-</file>
-
-<file path=customXml/item3.xml><?xml version="1.0" encoding="utf-8"?>
-<?mso-contentType ?>
-<FormTemplates xmlns="http://schemas.microsoft.com/sharepoint/v3/contenttype/forms">
-  <Display>DocumentLibraryForm</Display>
-  <Edit>DocumentLibraryForm</Edit>
-  <New>DocumentLibraryForm</New>
-</FormTemplates>
-</file>
-
 <file path=customXml/itemProps1.xml><?xml version="1.0" encoding="utf-8"?>
-<ds:datastoreItem xmlns:ds="http://schemas.openxmlformats.org/officeDocument/2006/customXml" ds:itemID="{149D4D71-E531-43EE-8F1C-8460734920B2}">
+<ds:datastoreItem xmlns:ds="http://schemas.openxmlformats.org/officeDocument/2006/customXml" ds:itemID="{C1BF3681-C3E5-4AF6-8050-4743C0D56164}">
   <ds:schemaRefs>
-    <ds:schemaRef ds:uri="0a5436c3-62bb-42e4-abd1-a0a4955fdeca"/>
-    <ds:schemaRef ds:uri="80cd682b-b40f-411e-9891-5e2a388e0f2a"/>
-    <ds:schemaRef ds:uri="http://purl.org/dc/elements/1.1/"/>
-    <ds:schemaRef ds:uri="http://purl.org/dc/terms/"/>
-    <ds:schemaRef ds:uri="http://schemas.microsoft.com/internal/obd"/>
-    <ds:schemaRef ds:uri="http://schemas.microsoft.com/office/2006/documentManagement/types"/>
-    <ds:schemaRef ds:uri="http://schemas.microsoft.com/office/2006/metadata/contentType"/>
-    <ds:schemaRef ds:uri="http://schemas.microsoft.com/office/2006/metadata/properties"/>
-    <ds:schemaRef ds:uri="http://schemas.microsoft.com/office/2006/metadata/properties/metaAttributes"/>
-    <ds:schemaRef ds:uri="http://schemas.microsoft.com/office/infopath/2007/PartnerControls"/>
-    <ds:schemaRef ds:uri="http://schemas.openxmlformats.org/package/2006/metadata/core-properties"/>
-    <ds:schemaRef ds:uri="http://www.w3.org/2001/XMLSchema"/>
+    <ds:schemaRef ds:uri="http://schemas.microsoft.com/sharepoint/v3/contenttype/forms"/>
   </ds:schemaRefs>
 </ds:datastoreItem>
 </file>
@@ -9071,9 +8884,20 @@
 </file>
 
 <file path=customXml/itemProps3.xml><?xml version="1.0" encoding="utf-8"?>
-<ds:datastoreItem xmlns:ds="http://schemas.openxmlformats.org/officeDocument/2006/customXml" ds:itemID="{C1BF3681-C3E5-4AF6-8050-4743C0D56164}">
+<ds:datastoreItem xmlns:ds="http://schemas.openxmlformats.org/officeDocument/2006/customXml" ds:itemID="{149D4D71-E531-43EE-8F1C-8460734920B2}">
   <ds:schemaRefs>
-    <ds:schemaRef ds:uri="http://schemas.microsoft.com/sharepoint/v3/contenttype/forms"/>
+    <ds:schemaRef ds:uri="0a5436c3-62bb-42e4-abd1-a0a4955fdeca"/>
+    <ds:schemaRef ds:uri="80cd682b-b40f-411e-9891-5e2a388e0f2a"/>
+    <ds:schemaRef ds:uri="http://purl.org/dc/elements/1.1/"/>
+    <ds:schemaRef ds:uri="http://purl.org/dc/terms/"/>
+    <ds:schemaRef ds:uri="http://schemas.microsoft.com/internal/obd"/>
+    <ds:schemaRef ds:uri="http://schemas.microsoft.com/office/2006/documentManagement/types"/>
+    <ds:schemaRef ds:uri="http://schemas.microsoft.com/office/2006/metadata/contentType"/>
+    <ds:schemaRef ds:uri="http://schemas.microsoft.com/office/2006/metadata/properties"/>
+    <ds:schemaRef ds:uri="http://schemas.microsoft.com/office/2006/metadata/properties/metaAttributes"/>
+    <ds:schemaRef ds:uri="http://schemas.microsoft.com/office/infopath/2007/PartnerControls"/>
+    <ds:schemaRef ds:uri="http://schemas.openxmlformats.org/package/2006/metadata/core-properties"/>
+    <ds:schemaRef ds:uri="http://www.w3.org/2001/XMLSchema"/>
   </ds:schemaRefs>
 </ds:datastoreItem>
 </file>
</xml_diff>